<commit_message>
modified storage component class diagram
</commit_message>
<xml_diff>
--- a/docs/diagrams/StorageComponentClassDiagram.pptx
+++ b/docs/diagrams/StorageComponentClassDiagram.pptx
@@ -208,7 +208,7 @@
           <a:p>
             <a:fld id="{F5CC4B3F-88C1-4FFA-B1B6-F41C21DC6924}" type="datetimeFigureOut">
               <a:rPr lang="en-US" smtClean="0"/>
-              <a:t>12/1/2018</a:t>
+              <a:t>4/12/2019</a:t>
             </a:fld>
             <a:endParaRPr lang="en-US"/>
           </a:p>
@@ -654,7 +654,7 @@
           <a:p>
             <a:fld id="{78C97017-6FC3-485B-9764-EAC9E56C1D49}" type="datetimeFigureOut">
               <a:rPr lang="en-US" smtClean="0"/>
-              <a:t>12/1/2018</a:t>
+              <a:t>4/12/2019</a:t>
             </a:fld>
             <a:endParaRPr lang="en-US"/>
           </a:p>
@@ -822,7 +822,7 @@
           <a:p>
             <a:fld id="{78C97017-6FC3-485B-9764-EAC9E56C1D49}" type="datetimeFigureOut">
               <a:rPr lang="en-US" smtClean="0"/>
-              <a:t>12/1/2018</a:t>
+              <a:t>4/12/2019</a:t>
             </a:fld>
             <a:endParaRPr lang="en-US"/>
           </a:p>
@@ -1000,7 +1000,7 @@
           <a:p>
             <a:fld id="{78C97017-6FC3-485B-9764-EAC9E56C1D49}" type="datetimeFigureOut">
               <a:rPr lang="en-US" smtClean="0"/>
-              <a:t>12/1/2018</a:t>
+              <a:t>4/12/2019</a:t>
             </a:fld>
             <a:endParaRPr lang="en-US"/>
           </a:p>
@@ -1168,7 +1168,7 @@
           <a:p>
             <a:fld id="{78C97017-6FC3-485B-9764-EAC9E56C1D49}" type="datetimeFigureOut">
               <a:rPr lang="en-US" smtClean="0"/>
-              <a:t>12/1/2018</a:t>
+              <a:t>4/12/2019</a:t>
             </a:fld>
             <a:endParaRPr lang="en-US"/>
           </a:p>
@@ -1413,7 +1413,7 @@
           <a:p>
             <a:fld id="{78C97017-6FC3-485B-9764-EAC9E56C1D49}" type="datetimeFigureOut">
               <a:rPr lang="en-US" smtClean="0"/>
-              <a:t>12/1/2018</a:t>
+              <a:t>4/12/2019</a:t>
             </a:fld>
             <a:endParaRPr lang="en-US"/>
           </a:p>
@@ -1698,7 +1698,7 @@
           <a:p>
             <a:fld id="{78C97017-6FC3-485B-9764-EAC9E56C1D49}" type="datetimeFigureOut">
               <a:rPr lang="en-US" smtClean="0"/>
-              <a:t>12/1/2018</a:t>
+              <a:t>4/12/2019</a:t>
             </a:fld>
             <a:endParaRPr lang="en-US"/>
           </a:p>
@@ -2117,7 +2117,7 @@
           <a:p>
             <a:fld id="{78C97017-6FC3-485B-9764-EAC9E56C1D49}" type="datetimeFigureOut">
               <a:rPr lang="en-US" smtClean="0"/>
-              <a:t>12/1/2018</a:t>
+              <a:t>4/12/2019</a:t>
             </a:fld>
             <a:endParaRPr lang="en-US"/>
           </a:p>
@@ -2234,7 +2234,7 @@
           <a:p>
             <a:fld id="{78C97017-6FC3-485B-9764-EAC9E56C1D49}" type="datetimeFigureOut">
               <a:rPr lang="en-US" smtClean="0"/>
-              <a:t>12/1/2018</a:t>
+              <a:t>4/12/2019</a:t>
             </a:fld>
             <a:endParaRPr lang="en-US"/>
           </a:p>
@@ -2329,7 +2329,7 @@
           <a:p>
             <a:fld id="{78C97017-6FC3-485B-9764-EAC9E56C1D49}" type="datetimeFigureOut">
               <a:rPr lang="en-US" smtClean="0"/>
-              <a:t>12/1/2018</a:t>
+              <a:t>4/12/2019</a:t>
             </a:fld>
             <a:endParaRPr lang="en-US"/>
           </a:p>
@@ -2604,7 +2604,7 @@
           <a:p>
             <a:fld id="{78C97017-6FC3-485B-9764-EAC9E56C1D49}" type="datetimeFigureOut">
               <a:rPr lang="en-US" smtClean="0"/>
-              <a:t>12/1/2018</a:t>
+              <a:t>4/12/2019</a:t>
             </a:fld>
             <a:endParaRPr lang="en-US"/>
           </a:p>
@@ -2856,7 +2856,7 @@
           <a:p>
             <a:fld id="{78C97017-6FC3-485B-9764-EAC9E56C1D49}" type="datetimeFigureOut">
               <a:rPr lang="en-US" smtClean="0"/>
-              <a:t>12/1/2018</a:t>
+              <a:t>4/12/2019</a:t>
             </a:fld>
             <a:endParaRPr lang="en-US"/>
           </a:p>
@@ -3067,7 +3067,7 @@
           <a:p>
             <a:fld id="{78C97017-6FC3-485B-9764-EAC9E56C1D49}" type="datetimeFigureOut">
               <a:rPr lang="en-US" smtClean="0"/>
-              <a:t>12/1/2018</a:t>
+              <a:t>4/12/2019</a:t>
             </a:fld>
             <a:endParaRPr lang="en-US"/>
           </a:p>
@@ -3450,8 +3450,8 @@
         </p:nvSpPr>
         <p:spPr>
           <a:xfrm>
-            <a:off x="1119865" y="2086382"/>
-            <a:ext cx="7871735" cy="1723618"/>
+            <a:off x="304800" y="2162200"/>
+            <a:ext cx="8483644" cy="3837580"/>
           </a:xfrm>
           <a:prstGeom prst="roundRect">
             <a:avLst>
@@ -3509,14 +3509,14 @@
       </p:sp>
       <p:sp>
         <p:nvSpPr>
-          <p:cNvPr id="2" name="Rectangle 8"/>
+          <p:cNvPr id="9" name="Rectangle 62"/>
           <p:cNvSpPr/>
           <p:nvPr/>
         </p:nvSpPr>
         <p:spPr>
-          <a:xfrm>
-            <a:off x="2877180" y="3158440"/>
-            <a:ext cx="1323049" cy="346760"/>
+          <a:xfrm rot="16200000">
+            <a:off x="-136785" y="3931745"/>
+            <a:ext cx="3219752" cy="346760"/>
           </a:xfrm>
           <a:prstGeom prst="rect">
             <a:avLst/>
@@ -3555,27 +3555,12 @@
           <a:p>
             <a:pPr algn="ctr"/>
             <a:r>
-              <a:rPr lang="en-US" sz="1050" dirty="0">
-                <a:solidFill>
-                  <a:schemeClr val="bg1"/>
-                </a:solidFill>
-              </a:rPr>
-              <a:t>&lt;&lt;interface&gt;&gt;</a:t>
-            </a:r>
-            <a:br>
-              <a:rPr lang="en-US" sz="1050" dirty="0">
-                <a:solidFill>
-                  <a:schemeClr val="bg1"/>
-                </a:solidFill>
-              </a:rPr>
-            </a:br>
-            <a:r>
               <a:rPr lang="en-US" sz="1050" dirty="0" err="1">
                 <a:solidFill>
                   <a:schemeClr val="bg1"/>
                 </a:solidFill>
               </a:rPr>
-              <a:t>AddressBookStorage</a:t>
+              <a:t>StorageManager</a:t>
             </a:r>
             <a:endParaRPr lang="en-SG" sz="1050" dirty="0">
               <a:solidFill>
@@ -3587,13 +3572,13 @@
       </p:sp>
       <p:sp>
         <p:nvSpPr>
-          <p:cNvPr id="9" name="Rectangle 62"/>
+          <p:cNvPr id="119" name="Rectangle 62"/>
           <p:cNvSpPr/>
           <p:nvPr/>
         </p:nvSpPr>
         <p:spPr>
           <a:xfrm rot="16200000">
-            <a:off x="1683963" y="2868687"/>
+            <a:off x="185573" y="4004202"/>
             <a:ext cx="1093635" cy="346760"/>
           </a:xfrm>
           <a:prstGeom prst="rect">
@@ -3633,69 +3618,6 @@
           <a:p>
             <a:pPr algn="ctr"/>
             <a:r>
-              <a:rPr lang="en-US" sz="1050" dirty="0" err="1">
-                <a:solidFill>
-                  <a:schemeClr val="bg1"/>
-                </a:solidFill>
-              </a:rPr>
-              <a:t>StorageManager</a:t>
-            </a:r>
-            <a:endParaRPr lang="en-SG" sz="1050" dirty="0">
-              <a:solidFill>
-                <a:schemeClr val="bg1"/>
-              </a:solidFill>
-            </a:endParaRPr>
-          </a:p>
-        </p:txBody>
-      </p:sp>
-      <p:sp>
-        <p:nvSpPr>
-          <p:cNvPr id="119" name="Rectangle 62"/>
-          <p:cNvSpPr/>
-          <p:nvPr/>
-        </p:nvSpPr>
-        <p:spPr>
-          <a:xfrm rot="16200000">
-            <a:off x="956202" y="2861202"/>
-            <a:ext cx="1093635" cy="346760"/>
-          </a:xfrm>
-          <a:prstGeom prst="rect">
-            <a:avLst/>
-          </a:prstGeom>
-          <a:solidFill>
-            <a:schemeClr val="accent6">
-              <a:lumMod val="75000"/>
-            </a:schemeClr>
-          </a:solidFill>
-          <a:ln w="19050">
-            <a:solidFill>
-              <a:schemeClr val="accent6">
-                <a:lumMod val="75000"/>
-              </a:schemeClr>
-            </a:solidFill>
-          </a:ln>
-          <a:effectLst/>
-        </p:spPr>
-        <p:style>
-          <a:lnRef idx="1">
-            <a:schemeClr val="accent2"/>
-          </a:lnRef>
-          <a:fillRef idx="2">
-            <a:schemeClr val="accent2"/>
-          </a:fillRef>
-          <a:effectRef idx="1">
-            <a:schemeClr val="accent2"/>
-          </a:effectRef>
-          <a:fontRef idx="minor">
-            <a:schemeClr val="dk1"/>
-          </a:fontRef>
-        </p:style>
-        <p:txBody>
-          <a:bodyPr rtlCol="0" anchor="ctr"/>
-          <a:lstStyle/>
-          <a:p>
-            <a:pPr algn="ctr"/>
-            <a:r>
               <a:rPr lang="en-US" sz="1050" dirty="0">
                 <a:solidFill>
                   <a:schemeClr val="bg1"/>
@@ -3730,7 +3652,7 @@
         </p:nvSpPr>
         <p:spPr>
           <a:xfrm rot="16200000">
-            <a:off x="1626910" y="2952291"/>
+            <a:off x="856281" y="4095291"/>
             <a:ext cx="270504" cy="175523"/>
           </a:xfrm>
           <a:prstGeom prst="triangle">
@@ -3779,56 +3701,13 @@
       </p:sp>
       <p:cxnSp>
         <p:nvCxnSpPr>
-          <p:cNvPr id="58" name="Straight Arrow Connector 57"/>
-          <p:cNvCxnSpPr>
-            <a:stCxn id="42" idx="3"/>
-            <a:endCxn id="2" idx="1"/>
-          </p:cNvCxnSpPr>
-          <p:nvPr/>
-        </p:nvCxnSpPr>
-        <p:spPr>
-          <a:xfrm>
-            <a:off x="2656370" y="3326536"/>
-            <a:ext cx="220810" cy="5284"/>
-          </a:xfrm>
-          <a:prstGeom prst="straightConnector1">
-            <a:avLst/>
-          </a:prstGeom>
-          <a:ln w="19050">
-            <a:solidFill>
-              <a:schemeClr val="accent6">
-                <a:lumMod val="75000"/>
-              </a:schemeClr>
-            </a:solidFill>
-            <a:headEnd type="none" w="med" len="med"/>
-            <a:tailEnd type="arrow" w="med" len="med"/>
-          </a:ln>
-          <a:effectLst/>
-        </p:spPr>
-        <p:style>
-          <a:lnRef idx="1">
-            <a:schemeClr val="accent2"/>
-          </a:lnRef>
-          <a:fillRef idx="2">
-            <a:schemeClr val="accent2"/>
-          </a:fillRef>
-          <a:effectRef idx="1">
-            <a:schemeClr val="accent2"/>
-          </a:effectRef>
-          <a:fontRef idx="minor">
-            <a:schemeClr val="dk1"/>
-          </a:fontRef>
-        </p:style>
-      </p:cxnSp>
-      <p:cxnSp>
-        <p:nvCxnSpPr>
           <p:cNvPr id="75" name="Elbow Connector 122"/>
           <p:cNvCxnSpPr/>
           <p:nvPr/>
         </p:nvCxnSpPr>
         <p:spPr>
           <a:xfrm>
-            <a:off x="910091" y="3040053"/>
+            <a:off x="139462" y="4183053"/>
             <a:ext cx="419548" cy="2860"/>
           </a:xfrm>
           <a:prstGeom prst="bentConnector3">
@@ -3867,13 +3746,14 @@
         <p:nvCxnSpPr>
           <p:cNvPr id="21" name="Straight Connector 20"/>
           <p:cNvCxnSpPr>
+            <a:cxnSpLocks/>
             <a:stCxn id="120" idx="3"/>
           </p:cNvCxnSpPr>
           <p:nvPr/>
         </p:nvCxnSpPr>
         <p:spPr>
           <a:xfrm flipV="1">
-            <a:off x="1849924" y="3040052"/>
+            <a:off x="1079295" y="4183052"/>
             <a:ext cx="216105" cy="1"/>
           </a:xfrm>
           <a:prstGeom prst="line">
@@ -3908,286 +3788,13 @@
       </p:cxnSp>
       <p:sp>
         <p:nvSpPr>
-          <p:cNvPr id="42" name="Flowchart: Decision 96"/>
-          <p:cNvSpPr/>
-          <p:nvPr/>
-        </p:nvSpPr>
-        <p:spPr>
-          <a:xfrm>
-            <a:off x="2420322" y="3239846"/>
-            <a:ext cx="236048" cy="173380"/>
-          </a:xfrm>
-          <a:prstGeom prst="flowChartDecision">
-            <a:avLst/>
-          </a:prstGeom>
-          <a:noFill/>
-          <a:ln w="19050">
-            <a:solidFill>
-              <a:schemeClr val="accent6">
-                <a:lumMod val="75000"/>
-              </a:schemeClr>
-            </a:solidFill>
-          </a:ln>
-          <a:effectLst/>
-        </p:spPr>
-        <p:style>
-          <a:lnRef idx="1">
-            <a:schemeClr val="accent2"/>
-          </a:lnRef>
-          <a:fillRef idx="2">
-            <a:schemeClr val="accent2"/>
-          </a:fillRef>
-          <a:effectRef idx="1">
-            <a:schemeClr val="accent2"/>
-          </a:effectRef>
-          <a:fontRef idx="minor">
-            <a:schemeClr val="dk1"/>
-          </a:fontRef>
-        </p:style>
-        <p:txBody>
-          <a:bodyPr rtlCol="0" anchor="ctr"/>
-          <a:lstStyle/>
-          <a:p>
-            <a:pPr algn="ctr"/>
-            <a:endParaRPr lang="en-US" sz="1050">
-              <a:solidFill>
-                <a:schemeClr val="bg1"/>
-              </a:solidFill>
-            </a:endParaRPr>
-          </a:p>
-        </p:txBody>
-      </p:sp>
-      <p:cxnSp>
-        <p:nvCxnSpPr>
-          <p:cNvPr id="97" name="Elbow Connector 63"/>
-          <p:cNvCxnSpPr>
-            <a:stCxn id="99" idx="3"/>
-            <a:endCxn id="50" idx="1"/>
-          </p:cNvCxnSpPr>
-          <p:nvPr/>
-        </p:nvCxnSpPr>
-        <p:spPr>
-          <a:xfrm flipV="1">
-            <a:off x="4398041" y="3331820"/>
-            <a:ext cx="223324" cy="1"/>
-          </a:xfrm>
-          <a:prstGeom prst="bentConnector3">
-            <a:avLst>
-              <a:gd name="adj1" fmla="val 50000"/>
-            </a:avLst>
-          </a:prstGeom>
-          <a:ln w="19050">
-            <a:solidFill>
-              <a:schemeClr val="accent6">
-                <a:lumMod val="75000"/>
-              </a:schemeClr>
-            </a:solidFill>
-            <a:prstDash val="sysDot"/>
-            <a:headEnd type="none" w="med" len="med"/>
-            <a:tailEnd type="none" w="med" len="med"/>
-          </a:ln>
-          <a:effectLst/>
-        </p:spPr>
-        <p:style>
-          <a:lnRef idx="1">
-            <a:schemeClr val="accent2"/>
-          </a:lnRef>
-          <a:fillRef idx="2">
-            <a:schemeClr val="accent2"/>
-          </a:fillRef>
-          <a:effectRef idx="1">
-            <a:schemeClr val="accent2"/>
-          </a:effectRef>
-          <a:fontRef idx="minor">
-            <a:schemeClr val="dk1"/>
-          </a:fontRef>
-        </p:style>
-      </p:cxnSp>
-      <p:sp>
-        <p:nvSpPr>
-          <p:cNvPr id="99" name="Isosceles Triangle 102"/>
-          <p:cNvSpPr/>
-          <p:nvPr/>
-        </p:nvSpPr>
-        <p:spPr>
-          <a:xfrm rot="5400000" flipV="1">
-            <a:off x="4175027" y="3244059"/>
-            <a:ext cx="270504" cy="175523"/>
-          </a:xfrm>
-          <a:prstGeom prst="triangle">
-            <a:avLst/>
-          </a:prstGeom>
-          <a:solidFill>
-            <a:schemeClr val="accent6">
-              <a:lumMod val="75000"/>
-            </a:schemeClr>
-          </a:solidFill>
-          <a:ln w="19050">
-            <a:solidFill>
-              <a:schemeClr val="accent6">
-                <a:lumMod val="75000"/>
-              </a:schemeClr>
-            </a:solidFill>
-          </a:ln>
-          <a:effectLst/>
-        </p:spPr>
-        <p:style>
-          <a:lnRef idx="1">
-            <a:schemeClr val="accent2"/>
-          </a:lnRef>
-          <a:fillRef idx="2">
-            <a:schemeClr val="accent2"/>
-          </a:fillRef>
-          <a:effectRef idx="1">
-            <a:schemeClr val="accent2"/>
-          </a:effectRef>
-          <a:fontRef idx="minor">
-            <a:schemeClr val="dk1"/>
-          </a:fontRef>
-        </p:style>
-        <p:txBody>
-          <a:bodyPr rtlCol="0" anchor="ctr"/>
-          <a:lstStyle/>
-          <a:p>
-            <a:pPr algn="ctr"/>
-            <a:endParaRPr lang="en-SG" sz="1050">
-              <a:solidFill>
-                <a:schemeClr val="bg1"/>
-              </a:solidFill>
-            </a:endParaRPr>
-          </a:p>
-        </p:txBody>
-      </p:sp>
-      <p:cxnSp>
-        <p:nvCxnSpPr>
-          <p:cNvPr id="124" name="Elbow Connector 122"/>
-          <p:cNvCxnSpPr>
-            <a:stCxn id="50" idx="3"/>
-            <a:endCxn id="66" idx="1"/>
-          </p:cNvCxnSpPr>
-          <p:nvPr/>
-        </p:nvCxnSpPr>
-        <p:spPr>
-          <a:xfrm>
-            <a:off x="5791200" y="3331820"/>
-            <a:ext cx="228600" cy="1970"/>
-          </a:xfrm>
-          <a:prstGeom prst="bentConnector3">
-            <a:avLst>
-              <a:gd name="adj1" fmla="val 50000"/>
-            </a:avLst>
-          </a:prstGeom>
-          <a:ln w="19050">
-            <a:solidFill>
-              <a:schemeClr val="accent6">
-                <a:lumMod val="75000"/>
-              </a:schemeClr>
-            </a:solidFill>
-            <a:prstDash val="sysDot"/>
-            <a:headEnd type="none" w="med" len="med"/>
-            <a:tailEnd type="arrow" w="med" len="med"/>
-          </a:ln>
-          <a:effectLst/>
-        </p:spPr>
-        <p:style>
-          <a:lnRef idx="1">
-            <a:schemeClr val="accent2"/>
-          </a:lnRef>
-          <a:fillRef idx="2">
-            <a:schemeClr val="accent2"/>
-          </a:fillRef>
-          <a:effectRef idx="1">
-            <a:schemeClr val="accent2"/>
-          </a:effectRef>
-          <a:fontRef idx="minor">
-            <a:schemeClr val="dk1"/>
-          </a:fontRef>
-        </p:style>
-      </p:cxnSp>
-      <p:sp>
-        <p:nvSpPr>
-          <p:cNvPr id="50" name="Rectangle 8"/>
-          <p:cNvSpPr/>
-          <p:nvPr/>
-        </p:nvSpPr>
-        <p:spPr>
-          <a:xfrm>
-            <a:off x="4621365" y="3158440"/>
-            <a:ext cx="1169835" cy="346760"/>
-          </a:xfrm>
-          <a:prstGeom prst="rect">
-            <a:avLst/>
-          </a:prstGeom>
-          <a:ln w="19050"/>
-          <a:effectLst/>
-        </p:spPr>
-        <p:style>
-          <a:lnRef idx="1">
-            <a:schemeClr val="accent6"/>
-          </a:lnRef>
-          <a:fillRef idx="2">
-            <a:schemeClr val="accent6"/>
-          </a:fillRef>
-          <a:effectRef idx="1">
-            <a:schemeClr val="accent6"/>
-          </a:effectRef>
-          <a:fontRef idx="minor">
-            <a:schemeClr val="dk1"/>
-          </a:fontRef>
-        </p:style>
-        <p:txBody>
-          <a:bodyPr rtlCol="0" anchor="ctr"/>
-          <a:lstStyle/>
-          <a:p>
-            <a:pPr algn="ctr"/>
-            <a:r>
-              <a:rPr lang="en-US" sz="1050" b="1" dirty="0" err="1">
-                <a:solidFill>
-                  <a:schemeClr val="accent6">
-                    <a:lumMod val="75000"/>
-                  </a:schemeClr>
-                </a:solidFill>
-              </a:rPr>
-              <a:t>JsonAddressBook</a:t>
-            </a:r>
-            <a:br>
-              <a:rPr lang="en-US" sz="1050" b="1" dirty="0">
-                <a:solidFill>
-                  <a:schemeClr val="accent6">
-                    <a:lumMod val="75000"/>
-                  </a:schemeClr>
-                </a:solidFill>
-              </a:rPr>
-            </a:br>
-            <a:r>
-              <a:rPr lang="en-US" sz="1050" b="1" dirty="0">
-                <a:solidFill>
-                  <a:schemeClr val="accent6">
-                    <a:lumMod val="75000"/>
-                  </a:schemeClr>
-                </a:solidFill>
-              </a:rPr>
-              <a:t>Storage</a:t>
-            </a:r>
-            <a:endParaRPr lang="en-SG" sz="1050" b="1" dirty="0">
-              <a:solidFill>
-                <a:schemeClr val="accent6">
-                  <a:lumMod val="75000"/>
-                </a:schemeClr>
-              </a:solidFill>
-            </a:endParaRPr>
-          </a:p>
-        </p:txBody>
-      </p:sp>
-      <p:sp>
-        <p:nvSpPr>
           <p:cNvPr id="52" name="Rectangle 8"/>
           <p:cNvSpPr/>
           <p:nvPr/>
         </p:nvSpPr>
         <p:spPr>
           <a:xfrm>
-            <a:off x="2873943" y="2558040"/>
+            <a:off x="2116251" y="2558040"/>
             <a:ext cx="1323049" cy="346760"/>
           </a:xfrm>
           <a:prstGeom prst="rect">
@@ -4268,7 +3875,7 @@
         </p:nvCxnSpPr>
         <p:spPr>
           <a:xfrm>
-            <a:off x="2653133" y="2726136"/>
+            <a:off x="1895441" y="2726136"/>
             <a:ext cx="220810" cy="5284"/>
           </a:xfrm>
           <a:prstGeom prst="straightConnector1">
@@ -4308,7 +3915,7 @@
         </p:nvSpPr>
         <p:spPr>
           <a:xfrm>
-            <a:off x="2417085" y="2639446"/>
+            <a:off x="1659393" y="2639446"/>
             <a:ext cx="236048" cy="173380"/>
           </a:xfrm>
           <a:prstGeom prst="flowChartDecision">
@@ -4362,7 +3969,7 @@
         </p:nvCxnSpPr>
         <p:spPr>
           <a:xfrm flipV="1">
-            <a:off x="4394804" y="2731420"/>
+            <a:off x="3637112" y="2731420"/>
             <a:ext cx="223324" cy="1"/>
           </a:xfrm>
           <a:prstGeom prst="bentConnector3">
@@ -4405,7 +4012,7 @@
         </p:nvSpPr>
         <p:spPr>
           <a:xfrm rot="5400000" flipV="1">
-            <a:off x="4171790" y="2643659"/>
+            <a:off x="3414098" y="2643659"/>
             <a:ext cx="270504" cy="175523"/>
           </a:xfrm>
           <a:prstGeom prst="triangle">
@@ -4460,7 +4067,7 @@
         </p:nvSpPr>
         <p:spPr>
           <a:xfrm>
-            <a:off x="4618128" y="2558040"/>
+            <a:off x="3860436" y="2558040"/>
             <a:ext cx="1093635" cy="346760"/>
           </a:xfrm>
           <a:prstGeom prst="rect">
@@ -4532,14 +4139,14 @@
       </p:sp>
       <p:sp>
         <p:nvSpPr>
-          <p:cNvPr id="66" name="Rectangle 8"/>
+          <p:cNvPr id="73" name="Rectangle 8"/>
           <p:cNvSpPr/>
           <p:nvPr/>
         </p:nvSpPr>
         <p:spPr>
           <a:xfrm>
-            <a:off x="6019800" y="3160410"/>
-            <a:ext cx="1200707" cy="346760"/>
+            <a:off x="6856573" y="2477656"/>
+            <a:ext cx="1830227" cy="346760"/>
           </a:xfrm>
           <a:prstGeom prst="rect">
             <a:avLst/>
@@ -4574,123 +4181,6 @@
                   </a:schemeClr>
                 </a:solidFill>
               </a:rPr>
-              <a:t>JsonSerializable</a:t>
-            </a:r>
-            <a:br>
-              <a:rPr lang="en-US" sz="1050" b="1" dirty="0">
-                <a:solidFill>
-                  <a:schemeClr val="accent6">
-                    <a:lumMod val="75000"/>
-                  </a:schemeClr>
-                </a:solidFill>
-              </a:rPr>
-            </a:br>
-            <a:r>
-              <a:rPr lang="en-US" sz="1050" b="1" dirty="0" err="1">
-                <a:solidFill>
-                  <a:schemeClr val="accent6">
-                    <a:lumMod val="75000"/>
-                  </a:schemeClr>
-                </a:solidFill>
-              </a:rPr>
-              <a:t>AddressBook</a:t>
-            </a:r>
-            <a:endParaRPr lang="en-SG" sz="1050" b="1" dirty="0">
-              <a:solidFill>
-                <a:schemeClr val="accent6">
-                  <a:lumMod val="75000"/>
-                </a:schemeClr>
-              </a:solidFill>
-            </a:endParaRPr>
-          </a:p>
-        </p:txBody>
-      </p:sp>
-      <p:cxnSp>
-        <p:nvCxnSpPr>
-          <p:cNvPr id="70" name="Elbow Connector 122"/>
-          <p:cNvCxnSpPr>
-            <a:cxnSpLocks/>
-            <a:stCxn id="74" idx="0"/>
-            <a:endCxn id="73" idx="2"/>
-          </p:cNvCxnSpPr>
-          <p:nvPr/>
-        </p:nvCxnSpPr>
-        <p:spPr>
-          <a:xfrm rot="16200000" flipV="1">
-            <a:off x="8077993" y="2992019"/>
-            <a:ext cx="335208" cy="1"/>
-          </a:xfrm>
-          <a:prstGeom prst="bentConnector3">
-            <a:avLst>
-              <a:gd name="adj1" fmla="val 50000"/>
-            </a:avLst>
-          </a:prstGeom>
-          <a:ln w="19050">
-            <a:prstDash val="sysDot"/>
-            <a:headEnd type="none" w="med" len="med"/>
-            <a:tailEnd type="arrow" w="med" len="med"/>
-          </a:ln>
-          <a:effectLst/>
-        </p:spPr>
-        <p:style>
-          <a:lnRef idx="1">
-            <a:schemeClr val="accent6"/>
-          </a:lnRef>
-          <a:fillRef idx="2">
-            <a:schemeClr val="accent6"/>
-          </a:fillRef>
-          <a:effectRef idx="1">
-            <a:schemeClr val="accent6"/>
-          </a:effectRef>
-          <a:fontRef idx="minor">
-            <a:schemeClr val="dk1"/>
-          </a:fontRef>
-        </p:style>
-      </p:cxnSp>
-      <p:sp>
-        <p:nvSpPr>
-          <p:cNvPr id="73" name="Rectangle 8"/>
-          <p:cNvSpPr/>
-          <p:nvPr/>
-        </p:nvSpPr>
-        <p:spPr>
-          <a:xfrm>
-            <a:off x="7615736" y="2477656"/>
-            <a:ext cx="1259719" cy="346760"/>
-          </a:xfrm>
-          <a:prstGeom prst="rect">
-            <a:avLst/>
-          </a:prstGeom>
-          <a:ln w="19050"/>
-          <a:effectLst/>
-        </p:spPr>
-        <p:style>
-          <a:lnRef idx="1">
-            <a:schemeClr val="accent6"/>
-          </a:lnRef>
-          <a:fillRef idx="2">
-            <a:schemeClr val="accent6"/>
-          </a:fillRef>
-          <a:effectRef idx="1">
-            <a:schemeClr val="accent6"/>
-          </a:effectRef>
-          <a:fontRef idx="minor">
-            <a:schemeClr val="dk1"/>
-          </a:fontRef>
-        </p:style>
-        <p:txBody>
-          <a:bodyPr rtlCol="0" anchor="ctr"/>
-          <a:lstStyle/>
-          <a:p>
-            <a:pPr algn="ctr"/>
-            <a:r>
-              <a:rPr lang="en-US" sz="1050" b="1" dirty="0" err="1">
-                <a:solidFill>
-                  <a:schemeClr val="accent6">
-                    <a:lumMod val="75000"/>
-                  </a:schemeClr>
-                </a:solidFill>
-              </a:rPr>
               <a:t>JsonAdaptedTag</a:t>
             </a:r>
             <a:endParaRPr lang="en-SG" sz="1050" b="1" dirty="0">
@@ -4703,100 +4193,3521 @@
           </a:p>
         </p:txBody>
       </p:sp>
-      <p:sp>
-        <p:nvSpPr>
-          <p:cNvPr id="74" name="Rectangle 8"/>
-          <p:cNvSpPr/>
+      <p:grpSp>
+        <p:nvGrpSpPr>
+          <p:cNvPr id="16" name="Group 15">
+            <a:extLst>
+              <a:ext uri="{FF2B5EF4-FFF2-40B4-BE49-F238E27FC236}">
+                <a16:creationId xmlns:a16="http://schemas.microsoft.com/office/drawing/2014/main" id="{AB703E48-B97B-4896-970D-1C180A59A4BE}"/>
+              </a:ext>
+            </a:extLst>
+          </p:cNvPr>
+          <p:cNvGrpSpPr/>
           <p:nvPr/>
-        </p:nvSpPr>
-        <p:spPr>
+        </p:nvGrpSpPr>
+        <p:grpSpPr>
           <a:xfrm>
-            <a:off x="7615738" y="3159624"/>
-            <a:ext cx="1259718" cy="346760"/>
+            <a:off x="1659393" y="3673339"/>
+            <a:ext cx="6455133" cy="348730"/>
+            <a:chOff x="2362200" y="3766070"/>
+            <a:chExt cx="6455133" cy="348730"/>
           </a:xfrm>
-          <a:prstGeom prst="rect">
-            <a:avLst/>
-          </a:prstGeom>
-          <a:ln w="19050"/>
-          <a:effectLst/>
-        </p:spPr>
-        <p:style>
-          <a:lnRef idx="1">
-            <a:schemeClr val="accent6"/>
-          </a:lnRef>
-          <a:fillRef idx="2">
-            <a:schemeClr val="accent6"/>
-          </a:fillRef>
-          <a:effectRef idx="1">
-            <a:schemeClr val="accent6"/>
-          </a:effectRef>
-          <a:fontRef idx="minor">
-            <a:schemeClr val="dk1"/>
-          </a:fontRef>
-        </p:style>
-        <p:txBody>
-          <a:bodyPr rtlCol="0" anchor="ctr"/>
-          <a:lstStyle/>
-          <a:p>
-            <a:pPr algn="ctr"/>
-            <a:r>
-              <a:rPr lang="en-US" sz="1030" b="1" dirty="0" err="1">
+        </p:grpSpPr>
+        <p:sp>
+          <p:nvSpPr>
+            <p:cNvPr id="37" name="Rectangle 8">
+              <a:extLst>
+                <a:ext uri="{FF2B5EF4-FFF2-40B4-BE49-F238E27FC236}">
+                  <a16:creationId xmlns:a16="http://schemas.microsoft.com/office/drawing/2014/main" id="{0A55AA00-AF5D-458D-A915-3E3292DF9127}"/>
+                </a:ext>
+              </a:extLst>
+            </p:cNvPr>
+            <p:cNvSpPr/>
+            <p:nvPr/>
+          </p:nvSpPr>
+          <p:spPr>
+            <a:xfrm>
+              <a:off x="2773652" y="3766071"/>
+              <a:ext cx="1438663" cy="346760"/>
+            </a:xfrm>
+            <a:prstGeom prst="rect">
+              <a:avLst/>
+            </a:prstGeom>
+            <a:solidFill>
+              <a:schemeClr val="accent6">
+                <a:lumMod val="75000"/>
+              </a:schemeClr>
+            </a:solidFill>
+            <a:ln w="19050">
+              <a:solidFill>
+                <a:schemeClr val="accent6">
+                  <a:lumMod val="75000"/>
+                </a:schemeClr>
+              </a:solidFill>
+            </a:ln>
+            <a:effectLst/>
+          </p:spPr>
+          <p:style>
+            <a:lnRef idx="1">
+              <a:schemeClr val="accent2"/>
+            </a:lnRef>
+            <a:fillRef idx="2">
+              <a:schemeClr val="accent2"/>
+            </a:fillRef>
+            <a:effectRef idx="1">
+              <a:schemeClr val="accent2"/>
+            </a:effectRef>
+            <a:fontRef idx="minor">
+              <a:schemeClr val="dk1"/>
+            </a:fontRef>
+          </p:style>
+          <p:txBody>
+            <a:bodyPr rtlCol="0" anchor="ctr"/>
+            <a:lstStyle/>
+            <a:p>
+              <a:pPr algn="ctr"/>
+              <a:r>
+                <a:rPr lang="en-US" sz="1050" dirty="0">
+                  <a:solidFill>
+                    <a:schemeClr val="bg1"/>
+                  </a:solidFill>
+                </a:rPr>
+                <a:t>&lt;&lt;interface&gt;&gt;</a:t>
+              </a:r>
+              <a:br>
+                <a:rPr lang="en-US" sz="1050" dirty="0">
+                  <a:solidFill>
+                    <a:schemeClr val="bg1"/>
+                  </a:solidFill>
+                </a:rPr>
+              </a:br>
+              <a:r>
+                <a:rPr lang="en-US" sz="1050" dirty="0" err="1">
+                  <a:solidFill>
+                    <a:schemeClr val="bg1"/>
+                  </a:solidFill>
+                </a:rPr>
+                <a:t>ExpenditureListStorage</a:t>
+              </a:r>
+              <a:endParaRPr lang="en-SG" sz="1050" dirty="0">
+                <a:solidFill>
+                  <a:schemeClr val="bg1"/>
+                </a:solidFill>
+              </a:endParaRPr>
+            </a:p>
+          </p:txBody>
+        </p:sp>
+        <p:cxnSp>
+          <p:nvCxnSpPr>
+            <p:cNvPr id="38" name="Straight Arrow Connector 37">
+              <a:extLst>
+                <a:ext uri="{FF2B5EF4-FFF2-40B4-BE49-F238E27FC236}">
+                  <a16:creationId xmlns:a16="http://schemas.microsoft.com/office/drawing/2014/main" id="{E20F4467-CB1F-4147-841D-7B618C1E4443}"/>
+                </a:ext>
+              </a:extLst>
+            </p:cNvPr>
+            <p:cNvCxnSpPr>
+              <a:cxnSpLocks/>
+              <a:stCxn id="39" idx="3"/>
+              <a:endCxn id="37" idx="1"/>
+            </p:cNvCxnSpPr>
+            <p:nvPr/>
+          </p:nvCxnSpPr>
+          <p:spPr>
+            <a:xfrm>
+              <a:off x="2598248" y="3934167"/>
+              <a:ext cx="175404" cy="5284"/>
+            </a:xfrm>
+            <a:prstGeom prst="straightConnector1">
+              <a:avLst/>
+            </a:prstGeom>
+            <a:ln w="19050">
+              <a:solidFill>
+                <a:schemeClr val="accent6">
+                  <a:lumMod val="75000"/>
+                </a:schemeClr>
+              </a:solidFill>
+              <a:headEnd type="none" w="med" len="med"/>
+              <a:tailEnd type="arrow" w="med" len="med"/>
+            </a:ln>
+            <a:effectLst/>
+          </p:spPr>
+          <p:style>
+            <a:lnRef idx="1">
+              <a:schemeClr val="accent2"/>
+            </a:lnRef>
+            <a:fillRef idx="2">
+              <a:schemeClr val="accent2"/>
+            </a:fillRef>
+            <a:effectRef idx="1">
+              <a:schemeClr val="accent2"/>
+            </a:effectRef>
+            <a:fontRef idx="minor">
+              <a:schemeClr val="dk1"/>
+            </a:fontRef>
+          </p:style>
+        </p:cxnSp>
+        <p:sp>
+          <p:nvSpPr>
+            <p:cNvPr id="39" name="Flowchart: Decision 96">
+              <a:extLst>
+                <a:ext uri="{FF2B5EF4-FFF2-40B4-BE49-F238E27FC236}">
+                  <a16:creationId xmlns:a16="http://schemas.microsoft.com/office/drawing/2014/main" id="{0EFC5568-1E04-4E7A-9072-BB883CE26797}"/>
+                </a:ext>
+              </a:extLst>
+            </p:cNvPr>
+            <p:cNvSpPr/>
+            <p:nvPr/>
+          </p:nvSpPr>
+          <p:spPr>
+            <a:xfrm>
+              <a:off x="2362200" y="3847477"/>
+              <a:ext cx="236048" cy="173380"/>
+            </a:xfrm>
+            <a:prstGeom prst="flowChartDecision">
+              <a:avLst/>
+            </a:prstGeom>
+            <a:noFill/>
+            <a:ln w="19050">
+              <a:solidFill>
+                <a:schemeClr val="accent6">
+                  <a:lumMod val="75000"/>
+                </a:schemeClr>
+              </a:solidFill>
+            </a:ln>
+            <a:effectLst/>
+          </p:spPr>
+          <p:style>
+            <a:lnRef idx="1">
+              <a:schemeClr val="accent2"/>
+            </a:lnRef>
+            <a:fillRef idx="2">
+              <a:schemeClr val="accent2"/>
+            </a:fillRef>
+            <a:effectRef idx="1">
+              <a:schemeClr val="accent2"/>
+            </a:effectRef>
+            <a:fontRef idx="minor">
+              <a:schemeClr val="dk1"/>
+            </a:fontRef>
+          </p:style>
+          <p:txBody>
+            <a:bodyPr rtlCol="0" anchor="ctr"/>
+            <a:lstStyle/>
+            <a:p>
+              <a:pPr algn="ctr"/>
+              <a:endParaRPr lang="en-US" sz="1050">
+                <a:solidFill>
+                  <a:schemeClr val="bg1"/>
+                </a:solidFill>
+              </a:endParaRPr>
+            </a:p>
+          </p:txBody>
+        </p:sp>
+        <p:cxnSp>
+          <p:nvCxnSpPr>
+            <p:cNvPr id="40" name="Elbow Connector 63">
+              <a:extLst>
+                <a:ext uri="{FF2B5EF4-FFF2-40B4-BE49-F238E27FC236}">
+                  <a16:creationId xmlns:a16="http://schemas.microsoft.com/office/drawing/2014/main" id="{DAEE2872-9A1C-4DC1-9472-4E905FC8AD7A}"/>
+                </a:ext>
+              </a:extLst>
+            </p:cNvPr>
+            <p:cNvCxnSpPr>
+              <a:cxnSpLocks/>
+              <a:stCxn id="41" idx="3"/>
+              <a:endCxn id="44" idx="1"/>
+            </p:cNvCxnSpPr>
+            <p:nvPr/>
+          </p:nvCxnSpPr>
+          <p:spPr>
+            <a:xfrm flipV="1">
+              <a:off x="4400632" y="3939450"/>
+              <a:ext cx="162610" cy="1185"/>
+            </a:xfrm>
+            <a:prstGeom prst="bentConnector3">
+              <a:avLst>
+                <a:gd name="adj1" fmla="val 50000"/>
+              </a:avLst>
+            </a:prstGeom>
+            <a:ln w="19050">
+              <a:solidFill>
+                <a:schemeClr val="accent6">
+                  <a:lumMod val="75000"/>
+                </a:schemeClr>
+              </a:solidFill>
+              <a:prstDash val="sysDot"/>
+              <a:headEnd type="none" w="med" len="med"/>
+              <a:tailEnd type="none" w="med" len="med"/>
+            </a:ln>
+            <a:effectLst/>
+          </p:spPr>
+          <p:style>
+            <a:lnRef idx="1">
+              <a:schemeClr val="accent2"/>
+            </a:lnRef>
+            <a:fillRef idx="2">
+              <a:schemeClr val="accent2"/>
+            </a:fillRef>
+            <a:effectRef idx="1">
+              <a:schemeClr val="accent2"/>
+            </a:effectRef>
+            <a:fontRef idx="minor">
+              <a:schemeClr val="dk1"/>
+            </a:fontRef>
+          </p:style>
+        </p:cxnSp>
+        <p:sp>
+          <p:nvSpPr>
+            <p:cNvPr id="41" name="Isosceles Triangle 102">
+              <a:extLst>
+                <a:ext uri="{FF2B5EF4-FFF2-40B4-BE49-F238E27FC236}">
+                  <a16:creationId xmlns:a16="http://schemas.microsoft.com/office/drawing/2014/main" id="{0242A556-C9EB-47B6-946D-EA23F8779143}"/>
+                </a:ext>
+              </a:extLst>
+            </p:cNvPr>
+            <p:cNvSpPr/>
+            <p:nvPr/>
+          </p:nvSpPr>
+          <p:spPr>
+            <a:xfrm rot="5400000" flipV="1">
+              <a:off x="4177618" y="3852873"/>
+              <a:ext cx="270504" cy="175523"/>
+            </a:xfrm>
+            <a:prstGeom prst="triangle">
+              <a:avLst/>
+            </a:prstGeom>
+            <a:solidFill>
+              <a:schemeClr val="accent6">
+                <a:lumMod val="75000"/>
+              </a:schemeClr>
+            </a:solidFill>
+            <a:ln w="19050">
+              <a:solidFill>
+                <a:schemeClr val="accent6">
+                  <a:lumMod val="75000"/>
+                </a:schemeClr>
+              </a:solidFill>
+            </a:ln>
+            <a:effectLst/>
+          </p:spPr>
+          <p:style>
+            <a:lnRef idx="1">
+              <a:schemeClr val="accent2"/>
+            </a:lnRef>
+            <a:fillRef idx="2">
+              <a:schemeClr val="accent2"/>
+            </a:fillRef>
+            <a:effectRef idx="1">
+              <a:schemeClr val="accent2"/>
+            </a:effectRef>
+            <a:fontRef idx="minor">
+              <a:schemeClr val="dk1"/>
+            </a:fontRef>
+          </p:style>
+          <p:txBody>
+            <a:bodyPr rtlCol="0" anchor="ctr"/>
+            <a:lstStyle/>
+            <a:p>
+              <a:pPr algn="ctr"/>
+              <a:endParaRPr lang="en-SG" sz="1050">
+                <a:solidFill>
+                  <a:schemeClr val="bg1"/>
+                </a:solidFill>
+              </a:endParaRPr>
+            </a:p>
+          </p:txBody>
+        </p:sp>
+        <p:cxnSp>
+          <p:nvCxnSpPr>
+            <p:cNvPr id="43" name="Elbow Connector 122">
+              <a:extLst>
+                <a:ext uri="{FF2B5EF4-FFF2-40B4-BE49-F238E27FC236}">
+                  <a16:creationId xmlns:a16="http://schemas.microsoft.com/office/drawing/2014/main" id="{3952B033-4C38-489A-BCF1-B14071C96BC9}"/>
+                </a:ext>
+              </a:extLst>
+            </p:cNvPr>
+            <p:cNvCxnSpPr>
+              <a:stCxn id="44" idx="3"/>
+              <a:endCxn id="45" idx="1"/>
+            </p:cNvCxnSpPr>
+            <p:nvPr/>
+          </p:nvCxnSpPr>
+          <p:spPr>
+            <a:xfrm>
+              <a:off x="5733077" y="3939450"/>
+              <a:ext cx="228600" cy="1970"/>
+            </a:xfrm>
+            <a:prstGeom prst="bentConnector3">
+              <a:avLst>
+                <a:gd name="adj1" fmla="val 50000"/>
+              </a:avLst>
+            </a:prstGeom>
+            <a:ln w="19050">
+              <a:solidFill>
+                <a:schemeClr val="accent6">
+                  <a:lumMod val="75000"/>
+                </a:schemeClr>
+              </a:solidFill>
+              <a:prstDash val="sysDot"/>
+              <a:headEnd type="none" w="med" len="med"/>
+              <a:tailEnd type="arrow" w="med" len="med"/>
+            </a:ln>
+            <a:effectLst/>
+          </p:spPr>
+          <p:style>
+            <a:lnRef idx="1">
+              <a:schemeClr val="accent2"/>
+            </a:lnRef>
+            <a:fillRef idx="2">
+              <a:schemeClr val="accent2"/>
+            </a:fillRef>
+            <a:effectRef idx="1">
+              <a:schemeClr val="accent2"/>
+            </a:effectRef>
+            <a:fontRef idx="minor">
+              <a:schemeClr val="dk1"/>
+            </a:fontRef>
+          </p:style>
+        </p:cxnSp>
+        <p:sp>
+          <p:nvSpPr>
+            <p:cNvPr id="44" name="Rectangle 8">
+              <a:extLst>
+                <a:ext uri="{FF2B5EF4-FFF2-40B4-BE49-F238E27FC236}">
+                  <a16:creationId xmlns:a16="http://schemas.microsoft.com/office/drawing/2014/main" id="{7D8C40AE-922F-40AF-852E-5C0F549237AE}"/>
+                </a:ext>
+              </a:extLst>
+            </p:cNvPr>
+            <p:cNvSpPr/>
+            <p:nvPr/>
+          </p:nvSpPr>
+          <p:spPr>
+            <a:xfrm>
+              <a:off x="4563242" y="3766070"/>
+              <a:ext cx="1169835" cy="346760"/>
+            </a:xfrm>
+            <a:prstGeom prst="rect">
+              <a:avLst/>
+            </a:prstGeom>
+            <a:ln w="19050"/>
+            <a:effectLst/>
+          </p:spPr>
+          <p:style>
+            <a:lnRef idx="1">
+              <a:schemeClr val="accent6"/>
+            </a:lnRef>
+            <a:fillRef idx="2">
+              <a:schemeClr val="accent6"/>
+            </a:fillRef>
+            <a:effectRef idx="1">
+              <a:schemeClr val="accent6"/>
+            </a:effectRef>
+            <a:fontRef idx="minor">
+              <a:schemeClr val="dk1"/>
+            </a:fontRef>
+          </p:style>
+          <p:txBody>
+            <a:bodyPr rtlCol="0" anchor="ctr"/>
+            <a:lstStyle/>
+            <a:p>
+              <a:pPr algn="ctr"/>
+              <a:r>
+                <a:rPr lang="en-US" sz="900" b="1" dirty="0" err="1">
+                  <a:solidFill>
+                    <a:schemeClr val="accent6">
+                      <a:lumMod val="75000"/>
+                    </a:schemeClr>
+                  </a:solidFill>
+                </a:rPr>
+                <a:t>JsonExpenditureList</a:t>
+              </a:r>
+              <a:br>
+                <a:rPr lang="en-US" sz="900" b="1" dirty="0">
+                  <a:solidFill>
+                    <a:schemeClr val="accent6">
+                      <a:lumMod val="75000"/>
+                    </a:schemeClr>
+                  </a:solidFill>
+                </a:rPr>
+              </a:br>
+              <a:r>
+                <a:rPr lang="en-US" sz="900" b="1" dirty="0">
+                  <a:solidFill>
+                    <a:schemeClr val="accent6">
+                      <a:lumMod val="75000"/>
+                    </a:schemeClr>
+                  </a:solidFill>
+                </a:rPr>
+                <a:t>Storage</a:t>
+              </a:r>
+              <a:endParaRPr lang="en-SG" sz="900" b="1" dirty="0">
                 <a:solidFill>
                   <a:schemeClr val="accent6">
                     <a:lumMod val="75000"/>
                   </a:schemeClr>
                 </a:solidFill>
-              </a:rPr>
-              <a:t>JsonAdaptedPerson</a:t>
-            </a:r>
-            <a:endParaRPr lang="en-SG" sz="1030" b="1" dirty="0">
+              </a:endParaRPr>
+            </a:p>
+          </p:txBody>
+        </p:sp>
+        <p:sp>
+          <p:nvSpPr>
+            <p:cNvPr id="45" name="Rectangle 8">
+              <a:extLst>
+                <a:ext uri="{FF2B5EF4-FFF2-40B4-BE49-F238E27FC236}">
+                  <a16:creationId xmlns:a16="http://schemas.microsoft.com/office/drawing/2014/main" id="{6016A4A8-59B7-4700-943A-40D1C1249029}"/>
+                </a:ext>
+              </a:extLst>
+            </p:cNvPr>
+            <p:cNvSpPr/>
+            <p:nvPr/>
+          </p:nvSpPr>
+          <p:spPr>
+            <a:xfrm>
+              <a:off x="5961677" y="3768040"/>
+              <a:ext cx="1200707" cy="346760"/>
+            </a:xfrm>
+            <a:prstGeom prst="rect">
+              <a:avLst/>
+            </a:prstGeom>
+            <a:ln w="19050"/>
+            <a:effectLst/>
+          </p:spPr>
+          <p:style>
+            <a:lnRef idx="1">
+              <a:schemeClr val="accent6"/>
+            </a:lnRef>
+            <a:fillRef idx="2">
+              <a:schemeClr val="accent6"/>
+            </a:fillRef>
+            <a:effectRef idx="1">
+              <a:schemeClr val="accent6"/>
+            </a:effectRef>
+            <a:fontRef idx="minor">
+              <a:schemeClr val="dk1"/>
+            </a:fontRef>
+          </p:style>
+          <p:txBody>
+            <a:bodyPr rtlCol="0" anchor="ctr"/>
+            <a:lstStyle/>
+            <a:p>
+              <a:pPr algn="ctr"/>
+              <a:r>
+                <a:rPr lang="en-US" sz="1050" b="1" dirty="0" err="1">
+                  <a:solidFill>
+                    <a:schemeClr val="accent6">
+                      <a:lumMod val="75000"/>
+                    </a:schemeClr>
+                  </a:solidFill>
+                </a:rPr>
+                <a:t>JsonSerializable</a:t>
+              </a:r>
+              <a:br>
+                <a:rPr lang="en-US" sz="1050" b="1" dirty="0">
+                  <a:solidFill>
+                    <a:schemeClr val="accent6">
+                      <a:lumMod val="75000"/>
+                    </a:schemeClr>
+                  </a:solidFill>
+                </a:rPr>
+              </a:br>
+              <a:r>
+                <a:rPr lang="en-US" sz="1050" b="1" dirty="0" err="1">
+                  <a:solidFill>
+                    <a:schemeClr val="accent6">
+                      <a:lumMod val="75000"/>
+                    </a:schemeClr>
+                  </a:solidFill>
+                </a:rPr>
+                <a:t>ExpenditureList</a:t>
+              </a:r>
+              <a:endParaRPr lang="en-SG" sz="1050" b="1" dirty="0">
+                <a:solidFill>
+                  <a:schemeClr val="accent6">
+                    <a:lumMod val="75000"/>
+                  </a:schemeClr>
+                </a:solidFill>
+              </a:endParaRPr>
+            </a:p>
+          </p:txBody>
+        </p:sp>
+        <p:sp>
+          <p:nvSpPr>
+            <p:cNvPr id="46" name="Rectangle 8">
+              <a:extLst>
+                <a:ext uri="{FF2B5EF4-FFF2-40B4-BE49-F238E27FC236}">
+                  <a16:creationId xmlns:a16="http://schemas.microsoft.com/office/drawing/2014/main" id="{1F4E9550-C20B-4332-954E-201A446D72FD}"/>
+                </a:ext>
+              </a:extLst>
+            </p:cNvPr>
+            <p:cNvSpPr/>
+            <p:nvPr/>
+          </p:nvSpPr>
+          <p:spPr>
+            <a:xfrm>
+              <a:off x="7414714" y="3767254"/>
+              <a:ext cx="1402619" cy="346760"/>
+            </a:xfrm>
+            <a:prstGeom prst="rect">
+              <a:avLst/>
+            </a:prstGeom>
+            <a:ln w="19050"/>
+            <a:effectLst/>
+          </p:spPr>
+          <p:style>
+            <a:lnRef idx="1">
+              <a:schemeClr val="accent6"/>
+            </a:lnRef>
+            <a:fillRef idx="2">
+              <a:schemeClr val="accent6"/>
+            </a:fillRef>
+            <a:effectRef idx="1">
+              <a:schemeClr val="accent6"/>
+            </a:effectRef>
+            <a:fontRef idx="minor">
+              <a:schemeClr val="dk1"/>
+            </a:fontRef>
+          </p:style>
+          <p:txBody>
+            <a:bodyPr rtlCol="0" anchor="ctr"/>
+            <a:lstStyle/>
+            <a:p>
+              <a:pPr algn="ctr"/>
+              <a:r>
+                <a:rPr lang="en-US" sz="1030" b="1" dirty="0" err="1">
+                  <a:solidFill>
+                    <a:schemeClr val="accent6">
+                      <a:lumMod val="75000"/>
+                    </a:schemeClr>
+                  </a:solidFill>
+                </a:rPr>
+                <a:t>JsonAdaptedPurchase</a:t>
+              </a:r>
+              <a:endParaRPr lang="en-SG" sz="1030" b="1" dirty="0">
+                <a:solidFill>
+                  <a:schemeClr val="accent6">
+                    <a:lumMod val="75000"/>
+                  </a:schemeClr>
+                </a:solidFill>
+              </a:endParaRPr>
+            </a:p>
+          </p:txBody>
+        </p:sp>
+        <p:cxnSp>
+          <p:nvCxnSpPr>
+            <p:cNvPr id="47" name="Elbow Connector 122">
+              <a:extLst>
+                <a:ext uri="{FF2B5EF4-FFF2-40B4-BE49-F238E27FC236}">
+                  <a16:creationId xmlns:a16="http://schemas.microsoft.com/office/drawing/2014/main" id="{81CAA7D5-0BDD-4441-9273-A453F1F5E6EA}"/>
+                </a:ext>
+              </a:extLst>
+            </p:cNvPr>
+            <p:cNvCxnSpPr>
+              <a:cxnSpLocks/>
+              <a:stCxn id="45" idx="3"/>
+              <a:endCxn id="46" idx="1"/>
+            </p:cNvCxnSpPr>
+            <p:nvPr/>
+          </p:nvCxnSpPr>
+          <p:spPr>
+            <a:xfrm flipV="1">
+              <a:off x="7162384" y="3940634"/>
+              <a:ext cx="252330" cy="786"/>
+            </a:xfrm>
+            <a:prstGeom prst="bentConnector3">
+              <a:avLst>
+                <a:gd name="adj1" fmla="val 50000"/>
+              </a:avLst>
+            </a:prstGeom>
+            <a:ln w="19050">
+              <a:prstDash val="sysDot"/>
+              <a:headEnd type="none" w="med" len="med"/>
+              <a:tailEnd type="arrow" w="med" len="med"/>
+            </a:ln>
+            <a:effectLst/>
+          </p:spPr>
+          <p:style>
+            <a:lnRef idx="1">
+              <a:schemeClr val="accent6"/>
+            </a:lnRef>
+            <a:fillRef idx="2">
+              <a:schemeClr val="accent6"/>
+            </a:fillRef>
+            <a:effectRef idx="1">
+              <a:schemeClr val="accent6"/>
+            </a:effectRef>
+            <a:fontRef idx="minor">
+              <a:schemeClr val="dk1"/>
+            </a:fontRef>
+          </p:style>
+        </p:cxnSp>
+      </p:grpSp>
+      <p:grpSp>
+        <p:nvGrpSpPr>
+          <p:cNvPr id="101" name="Group 100">
+            <a:extLst>
+              <a:ext uri="{FF2B5EF4-FFF2-40B4-BE49-F238E27FC236}">
+                <a16:creationId xmlns:a16="http://schemas.microsoft.com/office/drawing/2014/main" id="{EF9D8D5C-B6BD-49D2-94C7-79DE4DE43768}"/>
+              </a:ext>
+            </a:extLst>
+          </p:cNvPr>
+          <p:cNvGrpSpPr/>
+          <p:nvPr/>
+        </p:nvGrpSpPr>
+        <p:grpSpPr>
+          <a:xfrm>
+            <a:off x="1659393" y="4188953"/>
+            <a:ext cx="6455133" cy="348730"/>
+            <a:chOff x="2362200" y="3766070"/>
+            <a:chExt cx="6455133" cy="348730"/>
+          </a:xfrm>
+        </p:grpSpPr>
+        <p:sp>
+          <p:nvSpPr>
+            <p:cNvPr id="102" name="Rectangle 8">
+              <a:extLst>
+                <a:ext uri="{FF2B5EF4-FFF2-40B4-BE49-F238E27FC236}">
+                  <a16:creationId xmlns:a16="http://schemas.microsoft.com/office/drawing/2014/main" id="{0B6540D6-9EA8-458F-9F3D-2EFFAA1AA7D2}"/>
+                </a:ext>
+              </a:extLst>
+            </p:cNvPr>
+            <p:cNvSpPr/>
+            <p:nvPr/>
+          </p:nvSpPr>
+          <p:spPr>
+            <a:xfrm>
+              <a:off x="2773652" y="3766071"/>
+              <a:ext cx="1438663" cy="346760"/>
+            </a:xfrm>
+            <a:prstGeom prst="rect">
+              <a:avLst/>
+            </a:prstGeom>
+            <a:solidFill>
+              <a:schemeClr val="accent6">
+                <a:lumMod val="75000"/>
+              </a:schemeClr>
+            </a:solidFill>
+            <a:ln w="19050">
               <a:solidFill>
                 <a:schemeClr val="accent6">
                   <a:lumMod val="75000"/>
                 </a:schemeClr>
               </a:solidFill>
-            </a:endParaRPr>
-          </a:p>
-        </p:txBody>
-      </p:sp>
+            </a:ln>
+            <a:effectLst/>
+          </p:spPr>
+          <p:style>
+            <a:lnRef idx="1">
+              <a:schemeClr val="accent2"/>
+            </a:lnRef>
+            <a:fillRef idx="2">
+              <a:schemeClr val="accent2"/>
+            </a:fillRef>
+            <a:effectRef idx="1">
+              <a:schemeClr val="accent2"/>
+            </a:effectRef>
+            <a:fontRef idx="minor">
+              <a:schemeClr val="dk1"/>
+            </a:fontRef>
+          </p:style>
+          <p:txBody>
+            <a:bodyPr rtlCol="0" anchor="ctr"/>
+            <a:lstStyle/>
+            <a:p>
+              <a:pPr algn="ctr"/>
+              <a:r>
+                <a:rPr lang="en-US" sz="1050" dirty="0">
+                  <a:solidFill>
+                    <a:schemeClr val="bg1"/>
+                  </a:solidFill>
+                </a:rPr>
+                <a:t>&lt;&lt;interface&gt;&gt;</a:t>
+              </a:r>
+              <a:br>
+                <a:rPr lang="en-US" sz="1050" dirty="0">
+                  <a:solidFill>
+                    <a:schemeClr val="bg1"/>
+                  </a:solidFill>
+                </a:rPr>
+              </a:br>
+              <a:r>
+                <a:rPr lang="en-US" sz="1050" dirty="0" err="1">
+                  <a:solidFill>
+                    <a:schemeClr val="bg1"/>
+                  </a:solidFill>
+                </a:rPr>
+                <a:t>WorkoutBookStorage</a:t>
+              </a:r>
+              <a:endParaRPr lang="en-SG" sz="1050" dirty="0">
+                <a:solidFill>
+                  <a:schemeClr val="bg1"/>
+                </a:solidFill>
+              </a:endParaRPr>
+            </a:p>
+          </p:txBody>
+        </p:sp>
+        <p:cxnSp>
+          <p:nvCxnSpPr>
+            <p:cNvPr id="103" name="Straight Arrow Connector 102">
+              <a:extLst>
+                <a:ext uri="{FF2B5EF4-FFF2-40B4-BE49-F238E27FC236}">
+                  <a16:creationId xmlns:a16="http://schemas.microsoft.com/office/drawing/2014/main" id="{46F72215-E25A-4A90-A132-A337CD173AF8}"/>
+                </a:ext>
+              </a:extLst>
+            </p:cNvPr>
+            <p:cNvCxnSpPr>
+              <a:cxnSpLocks/>
+              <a:stCxn id="104" idx="3"/>
+              <a:endCxn id="102" idx="1"/>
+            </p:cNvCxnSpPr>
+            <p:nvPr/>
+          </p:nvCxnSpPr>
+          <p:spPr>
+            <a:xfrm>
+              <a:off x="2598248" y="3934167"/>
+              <a:ext cx="175404" cy="5284"/>
+            </a:xfrm>
+            <a:prstGeom prst="straightConnector1">
+              <a:avLst/>
+            </a:prstGeom>
+            <a:ln w="19050">
+              <a:solidFill>
+                <a:schemeClr val="accent6">
+                  <a:lumMod val="75000"/>
+                </a:schemeClr>
+              </a:solidFill>
+              <a:headEnd type="none" w="med" len="med"/>
+              <a:tailEnd type="arrow" w="med" len="med"/>
+            </a:ln>
+            <a:effectLst/>
+          </p:spPr>
+          <p:style>
+            <a:lnRef idx="1">
+              <a:schemeClr val="accent2"/>
+            </a:lnRef>
+            <a:fillRef idx="2">
+              <a:schemeClr val="accent2"/>
+            </a:fillRef>
+            <a:effectRef idx="1">
+              <a:schemeClr val="accent2"/>
+            </a:effectRef>
+            <a:fontRef idx="minor">
+              <a:schemeClr val="dk1"/>
+            </a:fontRef>
+          </p:style>
+        </p:cxnSp>
+        <p:sp>
+          <p:nvSpPr>
+            <p:cNvPr id="104" name="Flowchart: Decision 96">
+              <a:extLst>
+                <a:ext uri="{FF2B5EF4-FFF2-40B4-BE49-F238E27FC236}">
+                  <a16:creationId xmlns:a16="http://schemas.microsoft.com/office/drawing/2014/main" id="{36B9E56F-0A41-497D-9B0E-F8092A86C9E7}"/>
+                </a:ext>
+              </a:extLst>
+            </p:cNvPr>
+            <p:cNvSpPr/>
+            <p:nvPr/>
+          </p:nvSpPr>
+          <p:spPr>
+            <a:xfrm>
+              <a:off x="2362200" y="3847477"/>
+              <a:ext cx="236048" cy="173380"/>
+            </a:xfrm>
+            <a:prstGeom prst="flowChartDecision">
+              <a:avLst/>
+            </a:prstGeom>
+            <a:noFill/>
+            <a:ln w="19050">
+              <a:solidFill>
+                <a:schemeClr val="accent6">
+                  <a:lumMod val="75000"/>
+                </a:schemeClr>
+              </a:solidFill>
+            </a:ln>
+            <a:effectLst/>
+          </p:spPr>
+          <p:style>
+            <a:lnRef idx="1">
+              <a:schemeClr val="accent2"/>
+            </a:lnRef>
+            <a:fillRef idx="2">
+              <a:schemeClr val="accent2"/>
+            </a:fillRef>
+            <a:effectRef idx="1">
+              <a:schemeClr val="accent2"/>
+            </a:effectRef>
+            <a:fontRef idx="minor">
+              <a:schemeClr val="dk1"/>
+            </a:fontRef>
+          </p:style>
+          <p:txBody>
+            <a:bodyPr rtlCol="0" anchor="ctr"/>
+            <a:lstStyle/>
+            <a:p>
+              <a:pPr algn="ctr"/>
+              <a:endParaRPr lang="en-US" sz="1050">
+                <a:solidFill>
+                  <a:schemeClr val="bg1"/>
+                </a:solidFill>
+              </a:endParaRPr>
+            </a:p>
+          </p:txBody>
+        </p:sp>
+        <p:cxnSp>
+          <p:nvCxnSpPr>
+            <p:cNvPr id="105" name="Elbow Connector 63">
+              <a:extLst>
+                <a:ext uri="{FF2B5EF4-FFF2-40B4-BE49-F238E27FC236}">
+                  <a16:creationId xmlns:a16="http://schemas.microsoft.com/office/drawing/2014/main" id="{612DC3EF-CCC0-4AB8-95AA-904E7C9DA89F}"/>
+                </a:ext>
+              </a:extLst>
+            </p:cNvPr>
+            <p:cNvCxnSpPr>
+              <a:cxnSpLocks/>
+              <a:stCxn id="106" idx="3"/>
+              <a:endCxn id="108" idx="1"/>
+            </p:cNvCxnSpPr>
+            <p:nvPr/>
+          </p:nvCxnSpPr>
+          <p:spPr>
+            <a:xfrm flipV="1">
+              <a:off x="4400632" y="3939450"/>
+              <a:ext cx="162610" cy="1185"/>
+            </a:xfrm>
+            <a:prstGeom prst="bentConnector3">
+              <a:avLst>
+                <a:gd name="adj1" fmla="val 50000"/>
+              </a:avLst>
+            </a:prstGeom>
+            <a:ln w="19050">
+              <a:solidFill>
+                <a:schemeClr val="accent6">
+                  <a:lumMod val="75000"/>
+                </a:schemeClr>
+              </a:solidFill>
+              <a:prstDash val="sysDot"/>
+              <a:headEnd type="none" w="med" len="med"/>
+              <a:tailEnd type="none" w="med" len="med"/>
+            </a:ln>
+            <a:effectLst/>
+          </p:spPr>
+          <p:style>
+            <a:lnRef idx="1">
+              <a:schemeClr val="accent2"/>
+            </a:lnRef>
+            <a:fillRef idx="2">
+              <a:schemeClr val="accent2"/>
+            </a:fillRef>
+            <a:effectRef idx="1">
+              <a:schemeClr val="accent2"/>
+            </a:effectRef>
+            <a:fontRef idx="minor">
+              <a:schemeClr val="dk1"/>
+            </a:fontRef>
+          </p:style>
+        </p:cxnSp>
+        <p:sp>
+          <p:nvSpPr>
+            <p:cNvPr id="106" name="Isosceles Triangle 102">
+              <a:extLst>
+                <a:ext uri="{FF2B5EF4-FFF2-40B4-BE49-F238E27FC236}">
+                  <a16:creationId xmlns:a16="http://schemas.microsoft.com/office/drawing/2014/main" id="{016224EA-833D-48C9-A191-EFA5D7E54F05}"/>
+                </a:ext>
+              </a:extLst>
+            </p:cNvPr>
+            <p:cNvSpPr/>
+            <p:nvPr/>
+          </p:nvSpPr>
+          <p:spPr>
+            <a:xfrm rot="5400000" flipV="1">
+              <a:off x="4177618" y="3852873"/>
+              <a:ext cx="270504" cy="175523"/>
+            </a:xfrm>
+            <a:prstGeom prst="triangle">
+              <a:avLst/>
+            </a:prstGeom>
+            <a:solidFill>
+              <a:schemeClr val="accent6">
+                <a:lumMod val="75000"/>
+              </a:schemeClr>
+            </a:solidFill>
+            <a:ln w="19050">
+              <a:solidFill>
+                <a:schemeClr val="accent6">
+                  <a:lumMod val="75000"/>
+                </a:schemeClr>
+              </a:solidFill>
+            </a:ln>
+            <a:effectLst/>
+          </p:spPr>
+          <p:style>
+            <a:lnRef idx="1">
+              <a:schemeClr val="accent2"/>
+            </a:lnRef>
+            <a:fillRef idx="2">
+              <a:schemeClr val="accent2"/>
+            </a:fillRef>
+            <a:effectRef idx="1">
+              <a:schemeClr val="accent2"/>
+            </a:effectRef>
+            <a:fontRef idx="minor">
+              <a:schemeClr val="dk1"/>
+            </a:fontRef>
+          </p:style>
+          <p:txBody>
+            <a:bodyPr rtlCol="0" anchor="ctr"/>
+            <a:lstStyle/>
+            <a:p>
+              <a:pPr algn="ctr"/>
+              <a:endParaRPr lang="en-SG" sz="1050">
+                <a:solidFill>
+                  <a:schemeClr val="bg1"/>
+                </a:solidFill>
+              </a:endParaRPr>
+            </a:p>
+          </p:txBody>
+        </p:sp>
+        <p:cxnSp>
+          <p:nvCxnSpPr>
+            <p:cNvPr id="107" name="Elbow Connector 122">
+              <a:extLst>
+                <a:ext uri="{FF2B5EF4-FFF2-40B4-BE49-F238E27FC236}">
+                  <a16:creationId xmlns:a16="http://schemas.microsoft.com/office/drawing/2014/main" id="{19CA7F2A-696F-44FB-A9E3-AF36141489F4}"/>
+                </a:ext>
+              </a:extLst>
+            </p:cNvPr>
+            <p:cNvCxnSpPr>
+              <a:stCxn id="108" idx="3"/>
+              <a:endCxn id="109" idx="1"/>
+            </p:cNvCxnSpPr>
+            <p:nvPr/>
+          </p:nvCxnSpPr>
+          <p:spPr>
+            <a:xfrm>
+              <a:off x="5733077" y="3939450"/>
+              <a:ext cx="228600" cy="1970"/>
+            </a:xfrm>
+            <a:prstGeom prst="bentConnector3">
+              <a:avLst>
+                <a:gd name="adj1" fmla="val 50000"/>
+              </a:avLst>
+            </a:prstGeom>
+            <a:ln w="19050">
+              <a:solidFill>
+                <a:schemeClr val="accent6">
+                  <a:lumMod val="75000"/>
+                </a:schemeClr>
+              </a:solidFill>
+              <a:prstDash val="sysDot"/>
+              <a:headEnd type="none" w="med" len="med"/>
+              <a:tailEnd type="arrow" w="med" len="med"/>
+            </a:ln>
+            <a:effectLst/>
+          </p:spPr>
+          <p:style>
+            <a:lnRef idx="1">
+              <a:schemeClr val="accent2"/>
+            </a:lnRef>
+            <a:fillRef idx="2">
+              <a:schemeClr val="accent2"/>
+            </a:fillRef>
+            <a:effectRef idx="1">
+              <a:schemeClr val="accent2"/>
+            </a:effectRef>
+            <a:fontRef idx="minor">
+              <a:schemeClr val="dk1"/>
+            </a:fontRef>
+          </p:style>
+        </p:cxnSp>
+        <p:sp>
+          <p:nvSpPr>
+            <p:cNvPr id="108" name="Rectangle 8">
+              <a:extLst>
+                <a:ext uri="{FF2B5EF4-FFF2-40B4-BE49-F238E27FC236}">
+                  <a16:creationId xmlns:a16="http://schemas.microsoft.com/office/drawing/2014/main" id="{52F685A1-6FDA-4B7D-BD08-48ECC42B8A19}"/>
+                </a:ext>
+              </a:extLst>
+            </p:cNvPr>
+            <p:cNvSpPr/>
+            <p:nvPr/>
+          </p:nvSpPr>
+          <p:spPr>
+            <a:xfrm>
+              <a:off x="4563242" y="3766070"/>
+              <a:ext cx="1169835" cy="346760"/>
+            </a:xfrm>
+            <a:prstGeom prst="rect">
+              <a:avLst/>
+            </a:prstGeom>
+            <a:ln w="19050"/>
+            <a:effectLst/>
+          </p:spPr>
+          <p:style>
+            <a:lnRef idx="1">
+              <a:schemeClr val="accent6"/>
+            </a:lnRef>
+            <a:fillRef idx="2">
+              <a:schemeClr val="accent6"/>
+            </a:fillRef>
+            <a:effectRef idx="1">
+              <a:schemeClr val="accent6"/>
+            </a:effectRef>
+            <a:fontRef idx="minor">
+              <a:schemeClr val="dk1"/>
+            </a:fontRef>
+          </p:style>
+          <p:txBody>
+            <a:bodyPr rtlCol="0" anchor="ctr"/>
+            <a:lstStyle/>
+            <a:p>
+              <a:pPr algn="ctr"/>
+              <a:r>
+                <a:rPr lang="en-US" sz="900" b="1" dirty="0" err="1">
+                  <a:solidFill>
+                    <a:schemeClr val="accent6">
+                      <a:lumMod val="75000"/>
+                    </a:schemeClr>
+                  </a:solidFill>
+                </a:rPr>
+                <a:t>JsonWorkoutBook</a:t>
+              </a:r>
+              <a:br>
+                <a:rPr lang="en-US" sz="900" b="1" dirty="0">
+                  <a:solidFill>
+                    <a:schemeClr val="accent6">
+                      <a:lumMod val="75000"/>
+                    </a:schemeClr>
+                  </a:solidFill>
+                </a:rPr>
+              </a:br>
+              <a:r>
+                <a:rPr lang="en-US" sz="900" b="1" dirty="0">
+                  <a:solidFill>
+                    <a:schemeClr val="accent6">
+                      <a:lumMod val="75000"/>
+                    </a:schemeClr>
+                  </a:solidFill>
+                </a:rPr>
+                <a:t>Storage</a:t>
+              </a:r>
+              <a:endParaRPr lang="en-SG" sz="900" b="1" dirty="0">
+                <a:solidFill>
+                  <a:schemeClr val="accent6">
+                    <a:lumMod val="75000"/>
+                  </a:schemeClr>
+                </a:solidFill>
+              </a:endParaRPr>
+            </a:p>
+          </p:txBody>
+        </p:sp>
+        <p:sp>
+          <p:nvSpPr>
+            <p:cNvPr id="109" name="Rectangle 8">
+              <a:extLst>
+                <a:ext uri="{FF2B5EF4-FFF2-40B4-BE49-F238E27FC236}">
+                  <a16:creationId xmlns:a16="http://schemas.microsoft.com/office/drawing/2014/main" id="{8EFEEC79-2118-4946-9727-3987E5B13F92}"/>
+                </a:ext>
+              </a:extLst>
+            </p:cNvPr>
+            <p:cNvSpPr/>
+            <p:nvPr/>
+          </p:nvSpPr>
+          <p:spPr>
+            <a:xfrm>
+              <a:off x="5961677" y="3768040"/>
+              <a:ext cx="1200707" cy="346760"/>
+            </a:xfrm>
+            <a:prstGeom prst="rect">
+              <a:avLst/>
+            </a:prstGeom>
+            <a:ln w="19050"/>
+            <a:effectLst/>
+          </p:spPr>
+          <p:style>
+            <a:lnRef idx="1">
+              <a:schemeClr val="accent6"/>
+            </a:lnRef>
+            <a:fillRef idx="2">
+              <a:schemeClr val="accent6"/>
+            </a:fillRef>
+            <a:effectRef idx="1">
+              <a:schemeClr val="accent6"/>
+            </a:effectRef>
+            <a:fontRef idx="minor">
+              <a:schemeClr val="dk1"/>
+            </a:fontRef>
+          </p:style>
+          <p:txBody>
+            <a:bodyPr rtlCol="0" anchor="ctr"/>
+            <a:lstStyle/>
+            <a:p>
+              <a:pPr algn="ctr"/>
+              <a:r>
+                <a:rPr lang="en-US" sz="1050" b="1" dirty="0" err="1">
+                  <a:solidFill>
+                    <a:schemeClr val="accent6">
+                      <a:lumMod val="75000"/>
+                    </a:schemeClr>
+                  </a:solidFill>
+                </a:rPr>
+                <a:t>JsonSerializable</a:t>
+              </a:r>
+              <a:br>
+                <a:rPr lang="en-US" sz="1050" b="1" dirty="0">
+                  <a:solidFill>
+                    <a:schemeClr val="accent6">
+                      <a:lumMod val="75000"/>
+                    </a:schemeClr>
+                  </a:solidFill>
+                </a:rPr>
+              </a:br>
+              <a:r>
+                <a:rPr lang="en-US" sz="1050" b="1" dirty="0" err="1">
+                  <a:solidFill>
+                    <a:schemeClr val="accent6">
+                      <a:lumMod val="75000"/>
+                    </a:schemeClr>
+                  </a:solidFill>
+                </a:rPr>
+                <a:t>WorkoutBook</a:t>
+              </a:r>
+              <a:endParaRPr lang="en-SG" sz="1050" b="1" dirty="0">
+                <a:solidFill>
+                  <a:schemeClr val="accent6">
+                    <a:lumMod val="75000"/>
+                  </a:schemeClr>
+                </a:solidFill>
+              </a:endParaRPr>
+            </a:p>
+          </p:txBody>
+        </p:sp>
+        <p:sp>
+          <p:nvSpPr>
+            <p:cNvPr id="110" name="Rectangle 8">
+              <a:extLst>
+                <a:ext uri="{FF2B5EF4-FFF2-40B4-BE49-F238E27FC236}">
+                  <a16:creationId xmlns:a16="http://schemas.microsoft.com/office/drawing/2014/main" id="{8DE55EEF-5888-4501-B938-61640A486885}"/>
+                </a:ext>
+              </a:extLst>
+            </p:cNvPr>
+            <p:cNvSpPr/>
+            <p:nvPr/>
+          </p:nvSpPr>
+          <p:spPr>
+            <a:xfrm>
+              <a:off x="7412729" y="3767254"/>
+              <a:ext cx="1404604" cy="346760"/>
+            </a:xfrm>
+            <a:prstGeom prst="rect">
+              <a:avLst/>
+            </a:prstGeom>
+            <a:ln w="19050"/>
+            <a:effectLst/>
+          </p:spPr>
+          <p:style>
+            <a:lnRef idx="1">
+              <a:schemeClr val="accent6"/>
+            </a:lnRef>
+            <a:fillRef idx="2">
+              <a:schemeClr val="accent6"/>
+            </a:fillRef>
+            <a:effectRef idx="1">
+              <a:schemeClr val="accent6"/>
+            </a:effectRef>
+            <a:fontRef idx="minor">
+              <a:schemeClr val="dk1"/>
+            </a:fontRef>
+          </p:style>
+          <p:txBody>
+            <a:bodyPr rtlCol="0" anchor="ctr"/>
+            <a:lstStyle/>
+            <a:p>
+              <a:pPr algn="ctr"/>
+              <a:r>
+                <a:rPr lang="en-US" sz="1030" b="1" dirty="0" err="1">
+                  <a:solidFill>
+                    <a:schemeClr val="accent6">
+                      <a:lumMod val="75000"/>
+                    </a:schemeClr>
+                  </a:solidFill>
+                </a:rPr>
+                <a:t>JsonAdaptedWorkout</a:t>
+              </a:r>
+              <a:endParaRPr lang="en-SG" sz="1030" b="1" dirty="0">
+                <a:solidFill>
+                  <a:schemeClr val="accent6">
+                    <a:lumMod val="75000"/>
+                  </a:schemeClr>
+                </a:solidFill>
+              </a:endParaRPr>
+            </a:p>
+          </p:txBody>
+        </p:sp>
+        <p:cxnSp>
+          <p:nvCxnSpPr>
+            <p:cNvPr id="111" name="Elbow Connector 122">
+              <a:extLst>
+                <a:ext uri="{FF2B5EF4-FFF2-40B4-BE49-F238E27FC236}">
+                  <a16:creationId xmlns:a16="http://schemas.microsoft.com/office/drawing/2014/main" id="{012A2ED0-23B5-4F3E-8268-FDA140856D98}"/>
+                </a:ext>
+              </a:extLst>
+            </p:cNvPr>
+            <p:cNvCxnSpPr>
+              <a:cxnSpLocks/>
+              <a:stCxn id="109" idx="3"/>
+              <a:endCxn id="110" idx="1"/>
+            </p:cNvCxnSpPr>
+            <p:nvPr/>
+          </p:nvCxnSpPr>
+          <p:spPr>
+            <a:xfrm flipV="1">
+              <a:off x="7162384" y="3940634"/>
+              <a:ext cx="250345" cy="786"/>
+            </a:xfrm>
+            <a:prstGeom prst="bentConnector3">
+              <a:avLst>
+                <a:gd name="adj1" fmla="val 50000"/>
+              </a:avLst>
+            </a:prstGeom>
+            <a:ln w="19050">
+              <a:prstDash val="sysDot"/>
+              <a:headEnd type="none" w="med" len="med"/>
+              <a:tailEnd type="arrow" w="med" len="med"/>
+            </a:ln>
+            <a:effectLst/>
+          </p:spPr>
+          <p:style>
+            <a:lnRef idx="1">
+              <a:schemeClr val="accent6"/>
+            </a:lnRef>
+            <a:fillRef idx="2">
+              <a:schemeClr val="accent6"/>
+            </a:fillRef>
+            <a:effectRef idx="1">
+              <a:schemeClr val="accent6"/>
+            </a:effectRef>
+            <a:fontRef idx="minor">
+              <a:schemeClr val="dk1"/>
+            </a:fontRef>
+          </p:style>
+        </p:cxnSp>
+      </p:grpSp>
+      <p:grpSp>
+        <p:nvGrpSpPr>
+          <p:cNvPr id="112" name="Group 111">
+            <a:extLst>
+              <a:ext uri="{FF2B5EF4-FFF2-40B4-BE49-F238E27FC236}">
+                <a16:creationId xmlns:a16="http://schemas.microsoft.com/office/drawing/2014/main" id="{E6ABC8B0-779C-47B2-8743-C70AA13C16EB}"/>
+              </a:ext>
+            </a:extLst>
+          </p:cNvPr>
+          <p:cNvGrpSpPr/>
+          <p:nvPr/>
+        </p:nvGrpSpPr>
+        <p:grpSpPr>
+          <a:xfrm>
+            <a:off x="1659393" y="4691946"/>
+            <a:ext cx="6455133" cy="348730"/>
+            <a:chOff x="2362200" y="3766070"/>
+            <a:chExt cx="6455133" cy="348730"/>
+          </a:xfrm>
+        </p:grpSpPr>
+        <p:sp>
+          <p:nvSpPr>
+            <p:cNvPr id="113" name="Rectangle 8">
+              <a:extLst>
+                <a:ext uri="{FF2B5EF4-FFF2-40B4-BE49-F238E27FC236}">
+                  <a16:creationId xmlns:a16="http://schemas.microsoft.com/office/drawing/2014/main" id="{8FFBA7DC-521F-4841-A266-CE7EA199641B}"/>
+                </a:ext>
+              </a:extLst>
+            </p:cNvPr>
+            <p:cNvSpPr/>
+            <p:nvPr/>
+          </p:nvSpPr>
+          <p:spPr>
+            <a:xfrm>
+              <a:off x="2756955" y="3766071"/>
+              <a:ext cx="1490545" cy="346760"/>
+            </a:xfrm>
+            <a:prstGeom prst="rect">
+              <a:avLst/>
+            </a:prstGeom>
+            <a:solidFill>
+              <a:schemeClr val="accent6">
+                <a:lumMod val="75000"/>
+              </a:schemeClr>
+            </a:solidFill>
+            <a:ln w="19050">
+              <a:solidFill>
+                <a:schemeClr val="accent6">
+                  <a:lumMod val="75000"/>
+                </a:schemeClr>
+              </a:solidFill>
+            </a:ln>
+            <a:effectLst/>
+          </p:spPr>
+          <p:style>
+            <a:lnRef idx="1">
+              <a:schemeClr val="accent2"/>
+            </a:lnRef>
+            <a:fillRef idx="2">
+              <a:schemeClr val="accent2"/>
+            </a:fillRef>
+            <a:effectRef idx="1">
+              <a:schemeClr val="accent2"/>
+            </a:effectRef>
+            <a:fontRef idx="minor">
+              <a:schemeClr val="dk1"/>
+            </a:fontRef>
+          </p:style>
+          <p:txBody>
+            <a:bodyPr rtlCol="0" anchor="ctr"/>
+            <a:lstStyle/>
+            <a:p>
+              <a:pPr algn="ctr"/>
+              <a:r>
+                <a:rPr lang="en-US" sz="1050" dirty="0">
+                  <a:solidFill>
+                    <a:schemeClr val="bg1"/>
+                  </a:solidFill>
+                </a:rPr>
+                <a:t>&lt;&lt;interface&gt;&gt;</a:t>
+              </a:r>
+              <a:br>
+                <a:rPr lang="en-US" sz="1050" dirty="0">
+                  <a:solidFill>
+                    <a:schemeClr val="bg1"/>
+                  </a:solidFill>
+                </a:rPr>
+              </a:br>
+              <a:r>
+                <a:rPr lang="en-US" sz="1050" dirty="0" err="1">
+                  <a:solidFill>
+                    <a:schemeClr val="bg1"/>
+                  </a:solidFill>
+                </a:rPr>
+                <a:t>HabitTrackerListStorage</a:t>
+              </a:r>
+              <a:endParaRPr lang="en-SG" sz="1050" dirty="0">
+                <a:solidFill>
+                  <a:schemeClr val="bg1"/>
+                </a:solidFill>
+              </a:endParaRPr>
+            </a:p>
+          </p:txBody>
+        </p:sp>
+        <p:cxnSp>
+          <p:nvCxnSpPr>
+            <p:cNvPr id="114" name="Straight Arrow Connector 113">
+              <a:extLst>
+                <a:ext uri="{FF2B5EF4-FFF2-40B4-BE49-F238E27FC236}">
+                  <a16:creationId xmlns:a16="http://schemas.microsoft.com/office/drawing/2014/main" id="{8C93B380-857D-4F66-A929-4C61EAD2EA76}"/>
+                </a:ext>
+              </a:extLst>
+            </p:cNvPr>
+            <p:cNvCxnSpPr>
+              <a:cxnSpLocks/>
+              <a:stCxn id="115" idx="3"/>
+              <a:endCxn id="113" idx="1"/>
+            </p:cNvCxnSpPr>
+            <p:nvPr/>
+          </p:nvCxnSpPr>
+          <p:spPr>
+            <a:xfrm>
+              <a:off x="2598248" y="3934167"/>
+              <a:ext cx="158707" cy="5284"/>
+            </a:xfrm>
+            <a:prstGeom prst="straightConnector1">
+              <a:avLst/>
+            </a:prstGeom>
+            <a:ln w="19050">
+              <a:solidFill>
+                <a:schemeClr val="accent6">
+                  <a:lumMod val="75000"/>
+                </a:schemeClr>
+              </a:solidFill>
+              <a:headEnd type="none" w="med" len="med"/>
+              <a:tailEnd type="arrow" w="med" len="med"/>
+            </a:ln>
+            <a:effectLst/>
+          </p:spPr>
+          <p:style>
+            <a:lnRef idx="1">
+              <a:schemeClr val="accent2"/>
+            </a:lnRef>
+            <a:fillRef idx="2">
+              <a:schemeClr val="accent2"/>
+            </a:fillRef>
+            <a:effectRef idx="1">
+              <a:schemeClr val="accent2"/>
+            </a:effectRef>
+            <a:fontRef idx="minor">
+              <a:schemeClr val="dk1"/>
+            </a:fontRef>
+          </p:style>
+        </p:cxnSp>
+        <p:sp>
+          <p:nvSpPr>
+            <p:cNvPr id="115" name="Flowchart: Decision 96">
+              <a:extLst>
+                <a:ext uri="{FF2B5EF4-FFF2-40B4-BE49-F238E27FC236}">
+                  <a16:creationId xmlns:a16="http://schemas.microsoft.com/office/drawing/2014/main" id="{D2A5B645-17F2-4057-8E28-9186FE73ECCB}"/>
+                </a:ext>
+              </a:extLst>
+            </p:cNvPr>
+            <p:cNvSpPr/>
+            <p:nvPr/>
+          </p:nvSpPr>
+          <p:spPr>
+            <a:xfrm>
+              <a:off x="2362200" y="3847477"/>
+              <a:ext cx="236048" cy="173380"/>
+            </a:xfrm>
+            <a:prstGeom prst="flowChartDecision">
+              <a:avLst/>
+            </a:prstGeom>
+            <a:noFill/>
+            <a:ln w="19050">
+              <a:solidFill>
+                <a:schemeClr val="accent6">
+                  <a:lumMod val="75000"/>
+                </a:schemeClr>
+              </a:solidFill>
+            </a:ln>
+            <a:effectLst/>
+          </p:spPr>
+          <p:style>
+            <a:lnRef idx="1">
+              <a:schemeClr val="accent2"/>
+            </a:lnRef>
+            <a:fillRef idx="2">
+              <a:schemeClr val="accent2"/>
+            </a:fillRef>
+            <a:effectRef idx="1">
+              <a:schemeClr val="accent2"/>
+            </a:effectRef>
+            <a:fontRef idx="minor">
+              <a:schemeClr val="dk1"/>
+            </a:fontRef>
+          </p:style>
+          <p:txBody>
+            <a:bodyPr rtlCol="0" anchor="ctr"/>
+            <a:lstStyle/>
+            <a:p>
+              <a:pPr algn="ctr"/>
+              <a:endParaRPr lang="en-US" sz="1050">
+                <a:solidFill>
+                  <a:schemeClr val="bg1"/>
+                </a:solidFill>
+              </a:endParaRPr>
+            </a:p>
+          </p:txBody>
+        </p:sp>
+        <p:cxnSp>
+          <p:nvCxnSpPr>
+            <p:cNvPr id="116" name="Elbow Connector 63">
+              <a:extLst>
+                <a:ext uri="{FF2B5EF4-FFF2-40B4-BE49-F238E27FC236}">
+                  <a16:creationId xmlns:a16="http://schemas.microsoft.com/office/drawing/2014/main" id="{5565BA67-8A73-499F-8EF6-8C584146D4DA}"/>
+                </a:ext>
+              </a:extLst>
+            </p:cNvPr>
+            <p:cNvCxnSpPr>
+              <a:cxnSpLocks/>
+              <a:stCxn id="117" idx="3"/>
+              <a:endCxn id="122" idx="1"/>
+            </p:cNvCxnSpPr>
+            <p:nvPr/>
+          </p:nvCxnSpPr>
+          <p:spPr>
+            <a:xfrm flipV="1">
+              <a:off x="4436607" y="3939450"/>
+              <a:ext cx="126635" cy="1186"/>
+            </a:xfrm>
+            <a:prstGeom prst="bentConnector3">
+              <a:avLst>
+                <a:gd name="adj1" fmla="val 50000"/>
+              </a:avLst>
+            </a:prstGeom>
+            <a:ln w="19050">
+              <a:solidFill>
+                <a:schemeClr val="accent6">
+                  <a:lumMod val="75000"/>
+                </a:schemeClr>
+              </a:solidFill>
+              <a:prstDash val="sysDot"/>
+              <a:headEnd type="none" w="med" len="med"/>
+              <a:tailEnd type="none" w="med" len="med"/>
+            </a:ln>
+            <a:effectLst/>
+          </p:spPr>
+          <p:style>
+            <a:lnRef idx="1">
+              <a:schemeClr val="accent2"/>
+            </a:lnRef>
+            <a:fillRef idx="2">
+              <a:schemeClr val="accent2"/>
+            </a:fillRef>
+            <a:effectRef idx="1">
+              <a:schemeClr val="accent2"/>
+            </a:effectRef>
+            <a:fontRef idx="minor">
+              <a:schemeClr val="dk1"/>
+            </a:fontRef>
+          </p:style>
+        </p:cxnSp>
+        <p:sp>
+          <p:nvSpPr>
+            <p:cNvPr id="117" name="Isosceles Triangle 102">
+              <a:extLst>
+                <a:ext uri="{FF2B5EF4-FFF2-40B4-BE49-F238E27FC236}">
+                  <a16:creationId xmlns:a16="http://schemas.microsoft.com/office/drawing/2014/main" id="{ECCDA998-37A8-4DA8-8D8C-9AC8633C4AB2}"/>
+                </a:ext>
+              </a:extLst>
+            </p:cNvPr>
+            <p:cNvSpPr/>
+            <p:nvPr/>
+          </p:nvSpPr>
+          <p:spPr>
+            <a:xfrm rot="5400000" flipV="1">
+              <a:off x="4213593" y="3852874"/>
+              <a:ext cx="270504" cy="175523"/>
+            </a:xfrm>
+            <a:prstGeom prst="triangle">
+              <a:avLst/>
+            </a:prstGeom>
+            <a:solidFill>
+              <a:schemeClr val="accent6">
+                <a:lumMod val="75000"/>
+              </a:schemeClr>
+            </a:solidFill>
+            <a:ln w="19050">
+              <a:solidFill>
+                <a:schemeClr val="accent6">
+                  <a:lumMod val="75000"/>
+                </a:schemeClr>
+              </a:solidFill>
+            </a:ln>
+            <a:effectLst/>
+          </p:spPr>
+          <p:style>
+            <a:lnRef idx="1">
+              <a:schemeClr val="accent2"/>
+            </a:lnRef>
+            <a:fillRef idx="2">
+              <a:schemeClr val="accent2"/>
+            </a:fillRef>
+            <a:effectRef idx="1">
+              <a:schemeClr val="accent2"/>
+            </a:effectRef>
+            <a:fontRef idx="minor">
+              <a:schemeClr val="dk1"/>
+            </a:fontRef>
+          </p:style>
+          <p:txBody>
+            <a:bodyPr rtlCol="0" anchor="ctr"/>
+            <a:lstStyle/>
+            <a:p>
+              <a:pPr algn="ctr"/>
+              <a:endParaRPr lang="en-SG" sz="1050">
+                <a:solidFill>
+                  <a:schemeClr val="bg1"/>
+                </a:solidFill>
+              </a:endParaRPr>
+            </a:p>
+          </p:txBody>
+        </p:sp>
+        <p:cxnSp>
+          <p:nvCxnSpPr>
+            <p:cNvPr id="121" name="Elbow Connector 122">
+              <a:extLst>
+                <a:ext uri="{FF2B5EF4-FFF2-40B4-BE49-F238E27FC236}">
+                  <a16:creationId xmlns:a16="http://schemas.microsoft.com/office/drawing/2014/main" id="{599CADB7-0709-4ACF-9870-84269A94B963}"/>
+                </a:ext>
+              </a:extLst>
+            </p:cNvPr>
+            <p:cNvCxnSpPr>
+              <a:stCxn id="122" idx="3"/>
+              <a:endCxn id="123" idx="1"/>
+            </p:cNvCxnSpPr>
+            <p:nvPr/>
+          </p:nvCxnSpPr>
+          <p:spPr>
+            <a:xfrm>
+              <a:off x="5733077" y="3939450"/>
+              <a:ext cx="228600" cy="1970"/>
+            </a:xfrm>
+            <a:prstGeom prst="bentConnector3">
+              <a:avLst>
+                <a:gd name="adj1" fmla="val 50000"/>
+              </a:avLst>
+            </a:prstGeom>
+            <a:ln w="19050">
+              <a:solidFill>
+                <a:schemeClr val="accent6">
+                  <a:lumMod val="75000"/>
+                </a:schemeClr>
+              </a:solidFill>
+              <a:prstDash val="sysDot"/>
+              <a:headEnd type="none" w="med" len="med"/>
+              <a:tailEnd type="arrow" w="med" len="med"/>
+            </a:ln>
+            <a:effectLst/>
+          </p:spPr>
+          <p:style>
+            <a:lnRef idx="1">
+              <a:schemeClr val="accent2"/>
+            </a:lnRef>
+            <a:fillRef idx="2">
+              <a:schemeClr val="accent2"/>
+            </a:fillRef>
+            <a:effectRef idx="1">
+              <a:schemeClr val="accent2"/>
+            </a:effectRef>
+            <a:fontRef idx="minor">
+              <a:schemeClr val="dk1"/>
+            </a:fontRef>
+          </p:style>
+        </p:cxnSp>
+        <p:sp>
+          <p:nvSpPr>
+            <p:cNvPr id="122" name="Rectangle 8">
+              <a:extLst>
+                <a:ext uri="{FF2B5EF4-FFF2-40B4-BE49-F238E27FC236}">
+                  <a16:creationId xmlns:a16="http://schemas.microsoft.com/office/drawing/2014/main" id="{ABF7E2E5-6B02-40CC-9AA0-C9ED7FF92F8F}"/>
+                </a:ext>
+              </a:extLst>
+            </p:cNvPr>
+            <p:cNvSpPr/>
+            <p:nvPr/>
+          </p:nvSpPr>
+          <p:spPr>
+            <a:xfrm>
+              <a:off x="4563242" y="3766070"/>
+              <a:ext cx="1169835" cy="346760"/>
+            </a:xfrm>
+            <a:prstGeom prst="rect">
+              <a:avLst/>
+            </a:prstGeom>
+            <a:ln w="19050"/>
+            <a:effectLst/>
+          </p:spPr>
+          <p:style>
+            <a:lnRef idx="1">
+              <a:schemeClr val="accent6"/>
+            </a:lnRef>
+            <a:fillRef idx="2">
+              <a:schemeClr val="accent6"/>
+            </a:fillRef>
+            <a:effectRef idx="1">
+              <a:schemeClr val="accent6"/>
+            </a:effectRef>
+            <a:fontRef idx="minor">
+              <a:schemeClr val="dk1"/>
+            </a:fontRef>
+          </p:style>
+          <p:txBody>
+            <a:bodyPr rtlCol="0" anchor="ctr"/>
+            <a:lstStyle/>
+            <a:p>
+              <a:pPr algn="ctr"/>
+              <a:r>
+                <a:rPr lang="en-US" sz="900" b="1" dirty="0" err="1">
+                  <a:solidFill>
+                    <a:schemeClr val="accent6">
+                      <a:lumMod val="75000"/>
+                    </a:schemeClr>
+                  </a:solidFill>
+                </a:rPr>
+                <a:t>JsonHabitTrackerList</a:t>
+              </a:r>
+              <a:br>
+                <a:rPr lang="en-US" sz="900" b="1" dirty="0">
+                  <a:solidFill>
+                    <a:schemeClr val="accent6">
+                      <a:lumMod val="75000"/>
+                    </a:schemeClr>
+                  </a:solidFill>
+                </a:rPr>
+              </a:br>
+              <a:r>
+                <a:rPr lang="en-US" sz="900" b="1" dirty="0">
+                  <a:solidFill>
+                    <a:schemeClr val="accent6">
+                      <a:lumMod val="75000"/>
+                    </a:schemeClr>
+                  </a:solidFill>
+                </a:rPr>
+                <a:t>Storage</a:t>
+              </a:r>
+              <a:endParaRPr lang="en-SG" sz="900" b="1" dirty="0">
+                <a:solidFill>
+                  <a:schemeClr val="accent6">
+                    <a:lumMod val="75000"/>
+                  </a:schemeClr>
+                </a:solidFill>
+              </a:endParaRPr>
+            </a:p>
+          </p:txBody>
+        </p:sp>
+        <p:sp>
+          <p:nvSpPr>
+            <p:cNvPr id="123" name="Rectangle 8">
+              <a:extLst>
+                <a:ext uri="{FF2B5EF4-FFF2-40B4-BE49-F238E27FC236}">
+                  <a16:creationId xmlns:a16="http://schemas.microsoft.com/office/drawing/2014/main" id="{3417AAEF-DF36-4275-A317-176F6269546B}"/>
+                </a:ext>
+              </a:extLst>
+            </p:cNvPr>
+            <p:cNvSpPr/>
+            <p:nvPr/>
+          </p:nvSpPr>
+          <p:spPr>
+            <a:xfrm>
+              <a:off x="5961677" y="3768040"/>
+              <a:ext cx="1200707" cy="346760"/>
+            </a:xfrm>
+            <a:prstGeom prst="rect">
+              <a:avLst/>
+            </a:prstGeom>
+            <a:ln w="19050"/>
+            <a:effectLst/>
+          </p:spPr>
+          <p:style>
+            <a:lnRef idx="1">
+              <a:schemeClr val="accent6"/>
+            </a:lnRef>
+            <a:fillRef idx="2">
+              <a:schemeClr val="accent6"/>
+            </a:fillRef>
+            <a:effectRef idx="1">
+              <a:schemeClr val="accent6"/>
+            </a:effectRef>
+            <a:fontRef idx="minor">
+              <a:schemeClr val="dk1"/>
+            </a:fontRef>
+          </p:style>
+          <p:txBody>
+            <a:bodyPr rtlCol="0" anchor="ctr"/>
+            <a:lstStyle/>
+            <a:p>
+              <a:pPr algn="ctr"/>
+              <a:r>
+                <a:rPr lang="en-US" sz="1050" b="1" dirty="0" err="1">
+                  <a:solidFill>
+                    <a:schemeClr val="accent6">
+                      <a:lumMod val="75000"/>
+                    </a:schemeClr>
+                  </a:solidFill>
+                </a:rPr>
+                <a:t>JsonSerializable</a:t>
+              </a:r>
+              <a:endParaRPr lang="en-US" sz="1050" b="1" dirty="0">
+                <a:solidFill>
+                  <a:schemeClr val="accent6">
+                    <a:lumMod val="75000"/>
+                  </a:schemeClr>
+                </a:solidFill>
+              </a:endParaRPr>
+            </a:p>
+            <a:p>
+              <a:pPr algn="ctr"/>
+              <a:r>
+                <a:rPr lang="en-US" sz="1050" b="1" dirty="0" err="1">
+                  <a:solidFill>
+                    <a:schemeClr val="accent6">
+                      <a:lumMod val="75000"/>
+                    </a:schemeClr>
+                  </a:solidFill>
+                </a:rPr>
+                <a:t>HabitTrackerList</a:t>
+              </a:r>
+              <a:endParaRPr lang="en-SG" sz="1050" b="1" dirty="0">
+                <a:solidFill>
+                  <a:schemeClr val="accent6">
+                    <a:lumMod val="75000"/>
+                  </a:schemeClr>
+                </a:solidFill>
+              </a:endParaRPr>
+            </a:p>
+          </p:txBody>
+        </p:sp>
+        <p:sp>
+          <p:nvSpPr>
+            <p:cNvPr id="125" name="Rectangle 8">
+              <a:extLst>
+                <a:ext uri="{FF2B5EF4-FFF2-40B4-BE49-F238E27FC236}">
+                  <a16:creationId xmlns:a16="http://schemas.microsoft.com/office/drawing/2014/main" id="{B67E10C6-391B-47E5-B968-9A96B262233A}"/>
+                </a:ext>
+              </a:extLst>
+            </p:cNvPr>
+            <p:cNvSpPr/>
+            <p:nvPr/>
+          </p:nvSpPr>
+          <p:spPr>
+            <a:xfrm>
+              <a:off x="7412729" y="3767254"/>
+              <a:ext cx="1404604" cy="346760"/>
+            </a:xfrm>
+            <a:prstGeom prst="rect">
+              <a:avLst/>
+            </a:prstGeom>
+            <a:ln w="19050"/>
+            <a:effectLst/>
+          </p:spPr>
+          <p:style>
+            <a:lnRef idx="1">
+              <a:schemeClr val="accent6"/>
+            </a:lnRef>
+            <a:fillRef idx="2">
+              <a:schemeClr val="accent6"/>
+            </a:fillRef>
+            <a:effectRef idx="1">
+              <a:schemeClr val="accent6"/>
+            </a:effectRef>
+            <a:fontRef idx="minor">
+              <a:schemeClr val="dk1"/>
+            </a:fontRef>
+          </p:style>
+          <p:txBody>
+            <a:bodyPr rtlCol="0" anchor="ctr"/>
+            <a:lstStyle/>
+            <a:p>
+              <a:pPr algn="ctr"/>
+              <a:r>
+                <a:rPr lang="en-US" sz="1030" b="1" dirty="0" err="1">
+                  <a:solidFill>
+                    <a:schemeClr val="accent6">
+                      <a:lumMod val="75000"/>
+                    </a:schemeClr>
+                  </a:solidFill>
+                </a:rPr>
+                <a:t>JsonAdaptedHabit</a:t>
+              </a:r>
+              <a:endParaRPr lang="en-SG" sz="1030" b="1" dirty="0">
+                <a:solidFill>
+                  <a:schemeClr val="accent6">
+                    <a:lumMod val="75000"/>
+                  </a:schemeClr>
+                </a:solidFill>
+              </a:endParaRPr>
+            </a:p>
+          </p:txBody>
+        </p:sp>
+        <p:cxnSp>
+          <p:nvCxnSpPr>
+            <p:cNvPr id="126" name="Elbow Connector 122">
+              <a:extLst>
+                <a:ext uri="{FF2B5EF4-FFF2-40B4-BE49-F238E27FC236}">
+                  <a16:creationId xmlns:a16="http://schemas.microsoft.com/office/drawing/2014/main" id="{7FCFB7FA-563A-4F6D-8FD1-9A50C24253C1}"/>
+                </a:ext>
+              </a:extLst>
+            </p:cNvPr>
+            <p:cNvCxnSpPr>
+              <a:cxnSpLocks/>
+              <a:stCxn id="123" idx="3"/>
+              <a:endCxn id="125" idx="1"/>
+            </p:cNvCxnSpPr>
+            <p:nvPr/>
+          </p:nvCxnSpPr>
+          <p:spPr>
+            <a:xfrm flipV="1">
+              <a:off x="7162384" y="3940634"/>
+              <a:ext cx="250345" cy="786"/>
+            </a:xfrm>
+            <a:prstGeom prst="bentConnector3">
+              <a:avLst>
+                <a:gd name="adj1" fmla="val 50000"/>
+              </a:avLst>
+            </a:prstGeom>
+            <a:ln w="19050">
+              <a:prstDash val="sysDot"/>
+              <a:headEnd type="none" w="med" len="med"/>
+              <a:tailEnd type="arrow" w="med" len="med"/>
+            </a:ln>
+            <a:effectLst/>
+          </p:spPr>
+          <p:style>
+            <a:lnRef idx="1">
+              <a:schemeClr val="accent6"/>
+            </a:lnRef>
+            <a:fillRef idx="2">
+              <a:schemeClr val="accent6"/>
+            </a:fillRef>
+            <a:effectRef idx="1">
+              <a:schemeClr val="accent6"/>
+            </a:effectRef>
+            <a:fontRef idx="minor">
+              <a:schemeClr val="dk1"/>
+            </a:fontRef>
+          </p:style>
+        </p:cxnSp>
+      </p:grpSp>
+      <p:grpSp>
+        <p:nvGrpSpPr>
+          <p:cNvPr id="127" name="Group 126">
+            <a:extLst>
+              <a:ext uri="{FF2B5EF4-FFF2-40B4-BE49-F238E27FC236}">
+                <a16:creationId xmlns:a16="http://schemas.microsoft.com/office/drawing/2014/main" id="{DA68F6AF-C8B4-4EEE-8FD1-570B15E69D7D}"/>
+              </a:ext>
+            </a:extLst>
+          </p:cNvPr>
+          <p:cNvGrpSpPr/>
+          <p:nvPr/>
+        </p:nvGrpSpPr>
+        <p:grpSpPr>
+          <a:xfrm>
+            <a:off x="1659393" y="5214221"/>
+            <a:ext cx="6455133" cy="348730"/>
+            <a:chOff x="2362200" y="3766070"/>
+            <a:chExt cx="6455133" cy="348730"/>
+          </a:xfrm>
+        </p:grpSpPr>
+        <p:sp>
+          <p:nvSpPr>
+            <p:cNvPr id="128" name="Rectangle 8">
+              <a:extLst>
+                <a:ext uri="{FF2B5EF4-FFF2-40B4-BE49-F238E27FC236}">
+                  <a16:creationId xmlns:a16="http://schemas.microsoft.com/office/drawing/2014/main" id="{703D9F53-ACB8-496B-BCBB-F64725E7F3E3}"/>
+                </a:ext>
+              </a:extLst>
+            </p:cNvPr>
+            <p:cNvSpPr/>
+            <p:nvPr/>
+          </p:nvSpPr>
+          <p:spPr>
+            <a:xfrm>
+              <a:off x="2773652" y="3766071"/>
+              <a:ext cx="1438663" cy="346760"/>
+            </a:xfrm>
+            <a:prstGeom prst="rect">
+              <a:avLst/>
+            </a:prstGeom>
+            <a:solidFill>
+              <a:schemeClr val="accent6">
+                <a:lumMod val="75000"/>
+              </a:schemeClr>
+            </a:solidFill>
+            <a:ln w="19050">
+              <a:solidFill>
+                <a:schemeClr val="accent6">
+                  <a:lumMod val="75000"/>
+                </a:schemeClr>
+              </a:solidFill>
+            </a:ln>
+            <a:effectLst/>
+          </p:spPr>
+          <p:style>
+            <a:lnRef idx="1">
+              <a:schemeClr val="accent2"/>
+            </a:lnRef>
+            <a:fillRef idx="2">
+              <a:schemeClr val="accent2"/>
+            </a:fillRef>
+            <a:effectRef idx="1">
+              <a:schemeClr val="accent2"/>
+            </a:effectRef>
+            <a:fontRef idx="minor">
+              <a:schemeClr val="dk1"/>
+            </a:fontRef>
+          </p:style>
+          <p:txBody>
+            <a:bodyPr rtlCol="0" anchor="ctr"/>
+            <a:lstStyle/>
+            <a:p>
+              <a:pPr algn="ctr"/>
+              <a:r>
+                <a:rPr lang="en-US" sz="1050" dirty="0">
+                  <a:solidFill>
+                    <a:schemeClr val="bg1"/>
+                  </a:solidFill>
+                </a:rPr>
+                <a:t>&lt;&lt;interface&gt;&gt;</a:t>
+              </a:r>
+              <a:br>
+                <a:rPr lang="en-US" sz="1050" dirty="0">
+                  <a:solidFill>
+                    <a:schemeClr val="bg1"/>
+                  </a:solidFill>
+                </a:rPr>
+              </a:br>
+              <a:r>
+                <a:rPr lang="en-US" sz="1050" dirty="0" err="1">
+                  <a:solidFill>
+                    <a:schemeClr val="bg1"/>
+                  </a:solidFill>
+                </a:rPr>
+                <a:t>ContactListStorage</a:t>
+              </a:r>
+              <a:endParaRPr lang="en-SG" sz="1050" dirty="0">
+                <a:solidFill>
+                  <a:schemeClr val="bg1"/>
+                </a:solidFill>
+              </a:endParaRPr>
+            </a:p>
+          </p:txBody>
+        </p:sp>
+        <p:cxnSp>
+          <p:nvCxnSpPr>
+            <p:cNvPr id="129" name="Straight Arrow Connector 128">
+              <a:extLst>
+                <a:ext uri="{FF2B5EF4-FFF2-40B4-BE49-F238E27FC236}">
+                  <a16:creationId xmlns:a16="http://schemas.microsoft.com/office/drawing/2014/main" id="{B1A6388B-EF39-4903-9E6F-0013E48CB765}"/>
+                </a:ext>
+              </a:extLst>
+            </p:cNvPr>
+            <p:cNvCxnSpPr>
+              <a:cxnSpLocks/>
+              <a:stCxn id="130" idx="3"/>
+              <a:endCxn id="128" idx="1"/>
+            </p:cNvCxnSpPr>
+            <p:nvPr/>
+          </p:nvCxnSpPr>
+          <p:spPr>
+            <a:xfrm>
+              <a:off x="2598248" y="3934167"/>
+              <a:ext cx="175404" cy="5284"/>
+            </a:xfrm>
+            <a:prstGeom prst="straightConnector1">
+              <a:avLst/>
+            </a:prstGeom>
+            <a:ln w="19050">
+              <a:solidFill>
+                <a:schemeClr val="accent6">
+                  <a:lumMod val="75000"/>
+                </a:schemeClr>
+              </a:solidFill>
+              <a:headEnd type="none" w="med" len="med"/>
+              <a:tailEnd type="arrow" w="med" len="med"/>
+            </a:ln>
+            <a:effectLst/>
+          </p:spPr>
+          <p:style>
+            <a:lnRef idx="1">
+              <a:schemeClr val="accent2"/>
+            </a:lnRef>
+            <a:fillRef idx="2">
+              <a:schemeClr val="accent2"/>
+            </a:fillRef>
+            <a:effectRef idx="1">
+              <a:schemeClr val="accent2"/>
+            </a:effectRef>
+            <a:fontRef idx="minor">
+              <a:schemeClr val="dk1"/>
+            </a:fontRef>
+          </p:style>
+        </p:cxnSp>
+        <p:sp>
+          <p:nvSpPr>
+            <p:cNvPr id="130" name="Flowchart: Decision 96">
+              <a:extLst>
+                <a:ext uri="{FF2B5EF4-FFF2-40B4-BE49-F238E27FC236}">
+                  <a16:creationId xmlns:a16="http://schemas.microsoft.com/office/drawing/2014/main" id="{70BD0935-2048-4A36-99DE-42306C01182F}"/>
+                </a:ext>
+              </a:extLst>
+            </p:cNvPr>
+            <p:cNvSpPr/>
+            <p:nvPr/>
+          </p:nvSpPr>
+          <p:spPr>
+            <a:xfrm>
+              <a:off x="2362200" y="3847477"/>
+              <a:ext cx="236048" cy="173380"/>
+            </a:xfrm>
+            <a:prstGeom prst="flowChartDecision">
+              <a:avLst/>
+            </a:prstGeom>
+            <a:noFill/>
+            <a:ln w="19050">
+              <a:solidFill>
+                <a:schemeClr val="accent6">
+                  <a:lumMod val="75000"/>
+                </a:schemeClr>
+              </a:solidFill>
+            </a:ln>
+            <a:effectLst/>
+          </p:spPr>
+          <p:style>
+            <a:lnRef idx="1">
+              <a:schemeClr val="accent2"/>
+            </a:lnRef>
+            <a:fillRef idx="2">
+              <a:schemeClr val="accent2"/>
+            </a:fillRef>
+            <a:effectRef idx="1">
+              <a:schemeClr val="accent2"/>
+            </a:effectRef>
+            <a:fontRef idx="minor">
+              <a:schemeClr val="dk1"/>
+            </a:fontRef>
+          </p:style>
+          <p:txBody>
+            <a:bodyPr rtlCol="0" anchor="ctr"/>
+            <a:lstStyle/>
+            <a:p>
+              <a:pPr algn="ctr"/>
+              <a:endParaRPr lang="en-US" sz="1050">
+                <a:solidFill>
+                  <a:schemeClr val="bg1"/>
+                </a:solidFill>
+              </a:endParaRPr>
+            </a:p>
+          </p:txBody>
+        </p:sp>
+        <p:cxnSp>
+          <p:nvCxnSpPr>
+            <p:cNvPr id="131" name="Elbow Connector 63">
+              <a:extLst>
+                <a:ext uri="{FF2B5EF4-FFF2-40B4-BE49-F238E27FC236}">
+                  <a16:creationId xmlns:a16="http://schemas.microsoft.com/office/drawing/2014/main" id="{F5F8D18F-AB74-4DDD-A9EA-9A9EB06E2460}"/>
+                </a:ext>
+              </a:extLst>
+            </p:cNvPr>
+            <p:cNvCxnSpPr>
+              <a:cxnSpLocks/>
+              <a:stCxn id="132" idx="3"/>
+              <a:endCxn id="134" idx="1"/>
+            </p:cNvCxnSpPr>
+            <p:nvPr/>
+          </p:nvCxnSpPr>
+          <p:spPr>
+            <a:xfrm flipV="1">
+              <a:off x="4400632" y="3939450"/>
+              <a:ext cx="162610" cy="1185"/>
+            </a:xfrm>
+            <a:prstGeom prst="bentConnector3">
+              <a:avLst>
+                <a:gd name="adj1" fmla="val 50000"/>
+              </a:avLst>
+            </a:prstGeom>
+            <a:ln w="19050">
+              <a:solidFill>
+                <a:schemeClr val="accent6">
+                  <a:lumMod val="75000"/>
+                </a:schemeClr>
+              </a:solidFill>
+              <a:prstDash val="sysDot"/>
+              <a:headEnd type="none" w="med" len="med"/>
+              <a:tailEnd type="none" w="med" len="med"/>
+            </a:ln>
+            <a:effectLst/>
+          </p:spPr>
+          <p:style>
+            <a:lnRef idx="1">
+              <a:schemeClr val="accent2"/>
+            </a:lnRef>
+            <a:fillRef idx="2">
+              <a:schemeClr val="accent2"/>
+            </a:fillRef>
+            <a:effectRef idx="1">
+              <a:schemeClr val="accent2"/>
+            </a:effectRef>
+            <a:fontRef idx="minor">
+              <a:schemeClr val="dk1"/>
+            </a:fontRef>
+          </p:style>
+        </p:cxnSp>
+        <p:sp>
+          <p:nvSpPr>
+            <p:cNvPr id="132" name="Isosceles Triangle 102">
+              <a:extLst>
+                <a:ext uri="{FF2B5EF4-FFF2-40B4-BE49-F238E27FC236}">
+                  <a16:creationId xmlns:a16="http://schemas.microsoft.com/office/drawing/2014/main" id="{DB1C08C2-447A-4495-A679-15851B00A3B9}"/>
+                </a:ext>
+              </a:extLst>
+            </p:cNvPr>
+            <p:cNvSpPr/>
+            <p:nvPr/>
+          </p:nvSpPr>
+          <p:spPr>
+            <a:xfrm rot="5400000" flipV="1">
+              <a:off x="4177618" y="3852873"/>
+              <a:ext cx="270504" cy="175523"/>
+            </a:xfrm>
+            <a:prstGeom prst="triangle">
+              <a:avLst/>
+            </a:prstGeom>
+            <a:solidFill>
+              <a:schemeClr val="accent6">
+                <a:lumMod val="75000"/>
+              </a:schemeClr>
+            </a:solidFill>
+            <a:ln w="19050">
+              <a:solidFill>
+                <a:schemeClr val="accent6">
+                  <a:lumMod val="75000"/>
+                </a:schemeClr>
+              </a:solidFill>
+            </a:ln>
+            <a:effectLst/>
+          </p:spPr>
+          <p:style>
+            <a:lnRef idx="1">
+              <a:schemeClr val="accent2"/>
+            </a:lnRef>
+            <a:fillRef idx="2">
+              <a:schemeClr val="accent2"/>
+            </a:fillRef>
+            <a:effectRef idx="1">
+              <a:schemeClr val="accent2"/>
+            </a:effectRef>
+            <a:fontRef idx="minor">
+              <a:schemeClr val="dk1"/>
+            </a:fontRef>
+          </p:style>
+          <p:txBody>
+            <a:bodyPr rtlCol="0" anchor="ctr"/>
+            <a:lstStyle/>
+            <a:p>
+              <a:pPr algn="ctr"/>
+              <a:endParaRPr lang="en-SG" sz="1050">
+                <a:solidFill>
+                  <a:schemeClr val="bg1"/>
+                </a:solidFill>
+              </a:endParaRPr>
+            </a:p>
+          </p:txBody>
+        </p:sp>
+        <p:cxnSp>
+          <p:nvCxnSpPr>
+            <p:cNvPr id="133" name="Elbow Connector 122">
+              <a:extLst>
+                <a:ext uri="{FF2B5EF4-FFF2-40B4-BE49-F238E27FC236}">
+                  <a16:creationId xmlns:a16="http://schemas.microsoft.com/office/drawing/2014/main" id="{2E2A1995-7019-4650-854D-BF3EEDE96373}"/>
+                </a:ext>
+              </a:extLst>
+            </p:cNvPr>
+            <p:cNvCxnSpPr>
+              <a:stCxn id="134" idx="3"/>
+              <a:endCxn id="135" idx="1"/>
+            </p:cNvCxnSpPr>
+            <p:nvPr/>
+          </p:nvCxnSpPr>
+          <p:spPr>
+            <a:xfrm>
+              <a:off x="5733077" y="3939450"/>
+              <a:ext cx="228600" cy="1970"/>
+            </a:xfrm>
+            <a:prstGeom prst="bentConnector3">
+              <a:avLst>
+                <a:gd name="adj1" fmla="val 50000"/>
+              </a:avLst>
+            </a:prstGeom>
+            <a:ln w="19050">
+              <a:solidFill>
+                <a:schemeClr val="accent6">
+                  <a:lumMod val="75000"/>
+                </a:schemeClr>
+              </a:solidFill>
+              <a:prstDash val="sysDot"/>
+              <a:headEnd type="none" w="med" len="med"/>
+              <a:tailEnd type="arrow" w="med" len="med"/>
+            </a:ln>
+            <a:effectLst/>
+          </p:spPr>
+          <p:style>
+            <a:lnRef idx="1">
+              <a:schemeClr val="accent2"/>
+            </a:lnRef>
+            <a:fillRef idx="2">
+              <a:schemeClr val="accent2"/>
+            </a:fillRef>
+            <a:effectRef idx="1">
+              <a:schemeClr val="accent2"/>
+            </a:effectRef>
+            <a:fontRef idx="minor">
+              <a:schemeClr val="dk1"/>
+            </a:fontRef>
+          </p:style>
+        </p:cxnSp>
+        <p:sp>
+          <p:nvSpPr>
+            <p:cNvPr id="134" name="Rectangle 8">
+              <a:extLst>
+                <a:ext uri="{FF2B5EF4-FFF2-40B4-BE49-F238E27FC236}">
+                  <a16:creationId xmlns:a16="http://schemas.microsoft.com/office/drawing/2014/main" id="{3BF9F6E6-57FA-4884-B0F8-F67D29463985}"/>
+                </a:ext>
+              </a:extLst>
+            </p:cNvPr>
+            <p:cNvSpPr/>
+            <p:nvPr/>
+          </p:nvSpPr>
+          <p:spPr>
+            <a:xfrm>
+              <a:off x="4563242" y="3766070"/>
+              <a:ext cx="1169835" cy="346760"/>
+            </a:xfrm>
+            <a:prstGeom prst="rect">
+              <a:avLst/>
+            </a:prstGeom>
+            <a:ln w="19050"/>
+            <a:effectLst/>
+          </p:spPr>
+          <p:style>
+            <a:lnRef idx="1">
+              <a:schemeClr val="accent6"/>
+            </a:lnRef>
+            <a:fillRef idx="2">
+              <a:schemeClr val="accent6"/>
+            </a:fillRef>
+            <a:effectRef idx="1">
+              <a:schemeClr val="accent6"/>
+            </a:effectRef>
+            <a:fontRef idx="minor">
+              <a:schemeClr val="dk1"/>
+            </a:fontRef>
+          </p:style>
+          <p:txBody>
+            <a:bodyPr rtlCol="0" anchor="ctr"/>
+            <a:lstStyle/>
+            <a:p>
+              <a:pPr algn="ctr"/>
+              <a:r>
+                <a:rPr lang="en-US" sz="900" b="1" dirty="0" err="1">
+                  <a:solidFill>
+                    <a:schemeClr val="accent6">
+                      <a:lumMod val="75000"/>
+                    </a:schemeClr>
+                  </a:solidFill>
+                </a:rPr>
+                <a:t>JsonContactList</a:t>
+              </a:r>
+              <a:br>
+                <a:rPr lang="en-US" sz="900" b="1" dirty="0">
+                  <a:solidFill>
+                    <a:schemeClr val="accent6">
+                      <a:lumMod val="75000"/>
+                    </a:schemeClr>
+                  </a:solidFill>
+                </a:rPr>
+              </a:br>
+              <a:r>
+                <a:rPr lang="en-US" sz="900" b="1" dirty="0">
+                  <a:solidFill>
+                    <a:schemeClr val="accent6">
+                      <a:lumMod val="75000"/>
+                    </a:schemeClr>
+                  </a:solidFill>
+                </a:rPr>
+                <a:t>Storage</a:t>
+              </a:r>
+              <a:endParaRPr lang="en-SG" sz="900" b="1" dirty="0">
+                <a:solidFill>
+                  <a:schemeClr val="accent6">
+                    <a:lumMod val="75000"/>
+                  </a:schemeClr>
+                </a:solidFill>
+              </a:endParaRPr>
+            </a:p>
+          </p:txBody>
+        </p:sp>
+        <p:sp>
+          <p:nvSpPr>
+            <p:cNvPr id="135" name="Rectangle 8">
+              <a:extLst>
+                <a:ext uri="{FF2B5EF4-FFF2-40B4-BE49-F238E27FC236}">
+                  <a16:creationId xmlns:a16="http://schemas.microsoft.com/office/drawing/2014/main" id="{44C65801-907E-46F4-B9BF-0131017E2394}"/>
+                </a:ext>
+              </a:extLst>
+            </p:cNvPr>
+            <p:cNvSpPr/>
+            <p:nvPr/>
+          </p:nvSpPr>
+          <p:spPr>
+            <a:xfrm>
+              <a:off x="5961677" y="3768040"/>
+              <a:ext cx="1200707" cy="346760"/>
+            </a:xfrm>
+            <a:prstGeom prst="rect">
+              <a:avLst/>
+            </a:prstGeom>
+            <a:ln w="19050"/>
+            <a:effectLst/>
+          </p:spPr>
+          <p:style>
+            <a:lnRef idx="1">
+              <a:schemeClr val="accent6"/>
+            </a:lnRef>
+            <a:fillRef idx="2">
+              <a:schemeClr val="accent6"/>
+            </a:fillRef>
+            <a:effectRef idx="1">
+              <a:schemeClr val="accent6"/>
+            </a:effectRef>
+            <a:fontRef idx="minor">
+              <a:schemeClr val="dk1"/>
+            </a:fontRef>
+          </p:style>
+          <p:txBody>
+            <a:bodyPr rtlCol="0" anchor="ctr"/>
+            <a:lstStyle/>
+            <a:p>
+              <a:pPr algn="ctr"/>
+              <a:r>
+                <a:rPr lang="en-US" sz="1050" b="1" dirty="0" err="1">
+                  <a:solidFill>
+                    <a:schemeClr val="accent6">
+                      <a:lumMod val="75000"/>
+                    </a:schemeClr>
+                  </a:solidFill>
+                </a:rPr>
+                <a:t>JsonSerializable</a:t>
+              </a:r>
+              <a:br>
+                <a:rPr lang="en-US" sz="1050" b="1" dirty="0">
+                  <a:solidFill>
+                    <a:schemeClr val="accent6">
+                      <a:lumMod val="75000"/>
+                    </a:schemeClr>
+                  </a:solidFill>
+                </a:rPr>
+              </a:br>
+              <a:r>
+                <a:rPr lang="en-US" sz="1050" b="1" dirty="0" err="1">
+                  <a:solidFill>
+                    <a:schemeClr val="accent6">
+                      <a:lumMod val="75000"/>
+                    </a:schemeClr>
+                  </a:solidFill>
+                </a:rPr>
+                <a:t>ContactList</a:t>
+              </a:r>
+              <a:endParaRPr lang="en-SG" sz="1050" b="1" dirty="0">
+                <a:solidFill>
+                  <a:schemeClr val="accent6">
+                    <a:lumMod val="75000"/>
+                  </a:schemeClr>
+                </a:solidFill>
+              </a:endParaRPr>
+            </a:p>
+          </p:txBody>
+        </p:sp>
+        <p:sp>
+          <p:nvSpPr>
+            <p:cNvPr id="136" name="Rectangle 8">
+              <a:extLst>
+                <a:ext uri="{FF2B5EF4-FFF2-40B4-BE49-F238E27FC236}">
+                  <a16:creationId xmlns:a16="http://schemas.microsoft.com/office/drawing/2014/main" id="{FC4B328B-86E5-4CF3-8FC0-1C465CBEEED0}"/>
+                </a:ext>
+              </a:extLst>
+            </p:cNvPr>
+            <p:cNvSpPr/>
+            <p:nvPr/>
+          </p:nvSpPr>
+          <p:spPr>
+            <a:xfrm>
+              <a:off x="7412729" y="3767254"/>
+              <a:ext cx="1404604" cy="346760"/>
+            </a:xfrm>
+            <a:prstGeom prst="rect">
+              <a:avLst/>
+            </a:prstGeom>
+            <a:ln w="19050"/>
+            <a:effectLst/>
+          </p:spPr>
+          <p:style>
+            <a:lnRef idx="1">
+              <a:schemeClr val="accent6"/>
+            </a:lnRef>
+            <a:fillRef idx="2">
+              <a:schemeClr val="accent6"/>
+            </a:fillRef>
+            <a:effectRef idx="1">
+              <a:schemeClr val="accent6"/>
+            </a:effectRef>
+            <a:fontRef idx="minor">
+              <a:schemeClr val="dk1"/>
+            </a:fontRef>
+          </p:style>
+          <p:txBody>
+            <a:bodyPr rtlCol="0" anchor="ctr"/>
+            <a:lstStyle/>
+            <a:p>
+              <a:pPr algn="ctr"/>
+              <a:r>
+                <a:rPr lang="en-US" sz="1030" b="1" dirty="0" err="1">
+                  <a:solidFill>
+                    <a:schemeClr val="accent6">
+                      <a:lumMod val="75000"/>
+                    </a:schemeClr>
+                  </a:solidFill>
+                </a:rPr>
+                <a:t>JsonAdaptedPerson</a:t>
+              </a:r>
+              <a:endParaRPr lang="en-SG" sz="1030" b="1" dirty="0">
+                <a:solidFill>
+                  <a:schemeClr val="accent6">
+                    <a:lumMod val="75000"/>
+                  </a:schemeClr>
+                </a:solidFill>
+              </a:endParaRPr>
+            </a:p>
+          </p:txBody>
+        </p:sp>
+        <p:cxnSp>
+          <p:nvCxnSpPr>
+            <p:cNvPr id="137" name="Elbow Connector 122">
+              <a:extLst>
+                <a:ext uri="{FF2B5EF4-FFF2-40B4-BE49-F238E27FC236}">
+                  <a16:creationId xmlns:a16="http://schemas.microsoft.com/office/drawing/2014/main" id="{748B1D17-8A25-4D37-9974-8FC2F6712C93}"/>
+                </a:ext>
+              </a:extLst>
+            </p:cNvPr>
+            <p:cNvCxnSpPr>
+              <a:cxnSpLocks/>
+              <a:stCxn id="135" idx="3"/>
+              <a:endCxn id="136" idx="1"/>
+            </p:cNvCxnSpPr>
+            <p:nvPr/>
+          </p:nvCxnSpPr>
+          <p:spPr>
+            <a:xfrm flipV="1">
+              <a:off x="7162384" y="3940634"/>
+              <a:ext cx="250345" cy="786"/>
+            </a:xfrm>
+            <a:prstGeom prst="bentConnector3">
+              <a:avLst>
+                <a:gd name="adj1" fmla="val 50000"/>
+              </a:avLst>
+            </a:prstGeom>
+            <a:ln w="19050">
+              <a:prstDash val="sysDot"/>
+              <a:headEnd type="none" w="med" len="med"/>
+              <a:tailEnd type="arrow" w="med" len="med"/>
+            </a:ln>
+            <a:effectLst/>
+          </p:spPr>
+          <p:style>
+            <a:lnRef idx="1">
+              <a:schemeClr val="accent6"/>
+            </a:lnRef>
+            <a:fillRef idx="2">
+              <a:schemeClr val="accent6"/>
+            </a:fillRef>
+            <a:effectRef idx="1">
+              <a:schemeClr val="accent6"/>
+            </a:effectRef>
+            <a:fontRef idx="minor">
+              <a:schemeClr val="dk1"/>
+            </a:fontRef>
+          </p:style>
+        </p:cxnSp>
+      </p:grpSp>
+      <p:grpSp>
+        <p:nvGrpSpPr>
+          <p:cNvPr id="138" name="Group 137">
+            <a:extLst>
+              <a:ext uri="{FF2B5EF4-FFF2-40B4-BE49-F238E27FC236}">
+                <a16:creationId xmlns:a16="http://schemas.microsoft.com/office/drawing/2014/main" id="{38BBE27D-8F3F-4D6E-9379-D3554E64A276}"/>
+              </a:ext>
+            </a:extLst>
+          </p:cNvPr>
+          <p:cNvGrpSpPr/>
+          <p:nvPr/>
+        </p:nvGrpSpPr>
+        <p:grpSpPr>
+          <a:xfrm>
+            <a:off x="1659393" y="3161773"/>
+            <a:ext cx="6455133" cy="348730"/>
+            <a:chOff x="2362200" y="3766070"/>
+            <a:chExt cx="6455133" cy="348730"/>
+          </a:xfrm>
+        </p:grpSpPr>
+        <p:sp>
+          <p:nvSpPr>
+            <p:cNvPr id="139" name="Rectangle 8">
+              <a:extLst>
+                <a:ext uri="{FF2B5EF4-FFF2-40B4-BE49-F238E27FC236}">
+                  <a16:creationId xmlns:a16="http://schemas.microsoft.com/office/drawing/2014/main" id="{B75F0B9D-22A8-40EA-8532-EF20FB6C3D1B}"/>
+                </a:ext>
+              </a:extLst>
+            </p:cNvPr>
+            <p:cNvSpPr/>
+            <p:nvPr/>
+          </p:nvSpPr>
+          <p:spPr>
+            <a:xfrm>
+              <a:off x="2773652" y="3766071"/>
+              <a:ext cx="1438663" cy="346760"/>
+            </a:xfrm>
+            <a:prstGeom prst="rect">
+              <a:avLst/>
+            </a:prstGeom>
+            <a:solidFill>
+              <a:schemeClr val="accent6">
+                <a:lumMod val="75000"/>
+              </a:schemeClr>
+            </a:solidFill>
+            <a:ln w="19050">
+              <a:solidFill>
+                <a:schemeClr val="accent6">
+                  <a:lumMod val="75000"/>
+                </a:schemeClr>
+              </a:solidFill>
+            </a:ln>
+            <a:effectLst/>
+          </p:spPr>
+          <p:style>
+            <a:lnRef idx="1">
+              <a:schemeClr val="accent2"/>
+            </a:lnRef>
+            <a:fillRef idx="2">
+              <a:schemeClr val="accent2"/>
+            </a:fillRef>
+            <a:effectRef idx="1">
+              <a:schemeClr val="accent2"/>
+            </a:effectRef>
+            <a:fontRef idx="minor">
+              <a:schemeClr val="dk1"/>
+            </a:fontRef>
+          </p:style>
+          <p:txBody>
+            <a:bodyPr rtlCol="0" anchor="ctr"/>
+            <a:lstStyle/>
+            <a:p>
+              <a:pPr algn="ctr"/>
+              <a:r>
+                <a:rPr lang="en-US" sz="1050" dirty="0">
+                  <a:solidFill>
+                    <a:schemeClr val="bg1"/>
+                  </a:solidFill>
+                </a:rPr>
+                <a:t>&lt;&lt;interface&gt;&gt;</a:t>
+              </a:r>
+              <a:br>
+                <a:rPr lang="en-US" sz="1050" dirty="0">
+                  <a:solidFill>
+                    <a:schemeClr val="bg1"/>
+                  </a:solidFill>
+                </a:rPr>
+              </a:br>
+              <a:r>
+                <a:rPr lang="en-US" sz="1050" dirty="0" err="1">
+                  <a:solidFill>
+                    <a:schemeClr val="bg1"/>
+                  </a:solidFill>
+                </a:rPr>
+                <a:t>TaskListStorage</a:t>
+              </a:r>
+              <a:endParaRPr lang="en-SG" sz="1050" dirty="0">
+                <a:solidFill>
+                  <a:schemeClr val="bg1"/>
+                </a:solidFill>
+              </a:endParaRPr>
+            </a:p>
+          </p:txBody>
+        </p:sp>
+        <p:cxnSp>
+          <p:nvCxnSpPr>
+            <p:cNvPr id="140" name="Straight Arrow Connector 139">
+              <a:extLst>
+                <a:ext uri="{FF2B5EF4-FFF2-40B4-BE49-F238E27FC236}">
+                  <a16:creationId xmlns:a16="http://schemas.microsoft.com/office/drawing/2014/main" id="{1296992E-95D5-4E8A-9FF6-F12661C46315}"/>
+                </a:ext>
+              </a:extLst>
+            </p:cNvPr>
+            <p:cNvCxnSpPr>
+              <a:cxnSpLocks/>
+              <a:stCxn id="141" idx="3"/>
+              <a:endCxn id="139" idx="1"/>
+            </p:cNvCxnSpPr>
+            <p:nvPr/>
+          </p:nvCxnSpPr>
+          <p:spPr>
+            <a:xfrm>
+              <a:off x="2598248" y="3934167"/>
+              <a:ext cx="175404" cy="5284"/>
+            </a:xfrm>
+            <a:prstGeom prst="straightConnector1">
+              <a:avLst/>
+            </a:prstGeom>
+            <a:ln w="19050">
+              <a:solidFill>
+                <a:schemeClr val="accent6">
+                  <a:lumMod val="75000"/>
+                </a:schemeClr>
+              </a:solidFill>
+              <a:headEnd type="none" w="med" len="med"/>
+              <a:tailEnd type="arrow" w="med" len="med"/>
+            </a:ln>
+            <a:effectLst/>
+          </p:spPr>
+          <p:style>
+            <a:lnRef idx="1">
+              <a:schemeClr val="accent2"/>
+            </a:lnRef>
+            <a:fillRef idx="2">
+              <a:schemeClr val="accent2"/>
+            </a:fillRef>
+            <a:effectRef idx="1">
+              <a:schemeClr val="accent2"/>
+            </a:effectRef>
+            <a:fontRef idx="minor">
+              <a:schemeClr val="dk1"/>
+            </a:fontRef>
+          </p:style>
+        </p:cxnSp>
+        <p:sp>
+          <p:nvSpPr>
+            <p:cNvPr id="141" name="Flowchart: Decision 96">
+              <a:extLst>
+                <a:ext uri="{FF2B5EF4-FFF2-40B4-BE49-F238E27FC236}">
+                  <a16:creationId xmlns:a16="http://schemas.microsoft.com/office/drawing/2014/main" id="{8C38D850-64A0-4A0D-8448-51D17EC35E2F}"/>
+                </a:ext>
+              </a:extLst>
+            </p:cNvPr>
+            <p:cNvSpPr/>
+            <p:nvPr/>
+          </p:nvSpPr>
+          <p:spPr>
+            <a:xfrm>
+              <a:off x="2362200" y="3847477"/>
+              <a:ext cx="236048" cy="173380"/>
+            </a:xfrm>
+            <a:prstGeom prst="flowChartDecision">
+              <a:avLst/>
+            </a:prstGeom>
+            <a:noFill/>
+            <a:ln w="19050">
+              <a:solidFill>
+                <a:schemeClr val="accent6">
+                  <a:lumMod val="75000"/>
+                </a:schemeClr>
+              </a:solidFill>
+            </a:ln>
+            <a:effectLst/>
+          </p:spPr>
+          <p:style>
+            <a:lnRef idx="1">
+              <a:schemeClr val="accent2"/>
+            </a:lnRef>
+            <a:fillRef idx="2">
+              <a:schemeClr val="accent2"/>
+            </a:fillRef>
+            <a:effectRef idx="1">
+              <a:schemeClr val="accent2"/>
+            </a:effectRef>
+            <a:fontRef idx="minor">
+              <a:schemeClr val="dk1"/>
+            </a:fontRef>
+          </p:style>
+          <p:txBody>
+            <a:bodyPr rtlCol="0" anchor="ctr"/>
+            <a:lstStyle/>
+            <a:p>
+              <a:pPr algn="ctr"/>
+              <a:endParaRPr lang="en-US" sz="1050">
+                <a:solidFill>
+                  <a:schemeClr val="bg1"/>
+                </a:solidFill>
+              </a:endParaRPr>
+            </a:p>
+          </p:txBody>
+        </p:sp>
+        <p:cxnSp>
+          <p:nvCxnSpPr>
+            <p:cNvPr id="142" name="Elbow Connector 63">
+              <a:extLst>
+                <a:ext uri="{FF2B5EF4-FFF2-40B4-BE49-F238E27FC236}">
+                  <a16:creationId xmlns:a16="http://schemas.microsoft.com/office/drawing/2014/main" id="{B72BC56E-A4B5-4C33-9573-E46B079625B5}"/>
+                </a:ext>
+              </a:extLst>
+            </p:cNvPr>
+            <p:cNvCxnSpPr>
+              <a:cxnSpLocks/>
+              <a:stCxn id="143" idx="3"/>
+              <a:endCxn id="145" idx="1"/>
+            </p:cNvCxnSpPr>
+            <p:nvPr/>
+          </p:nvCxnSpPr>
+          <p:spPr>
+            <a:xfrm flipV="1">
+              <a:off x="4400632" y="3939450"/>
+              <a:ext cx="162610" cy="1185"/>
+            </a:xfrm>
+            <a:prstGeom prst="bentConnector3">
+              <a:avLst>
+                <a:gd name="adj1" fmla="val 50000"/>
+              </a:avLst>
+            </a:prstGeom>
+            <a:ln w="19050">
+              <a:solidFill>
+                <a:schemeClr val="accent6">
+                  <a:lumMod val="75000"/>
+                </a:schemeClr>
+              </a:solidFill>
+              <a:prstDash val="sysDot"/>
+              <a:headEnd type="none" w="med" len="med"/>
+              <a:tailEnd type="none" w="med" len="med"/>
+            </a:ln>
+            <a:effectLst/>
+          </p:spPr>
+          <p:style>
+            <a:lnRef idx="1">
+              <a:schemeClr val="accent2"/>
+            </a:lnRef>
+            <a:fillRef idx="2">
+              <a:schemeClr val="accent2"/>
+            </a:fillRef>
+            <a:effectRef idx="1">
+              <a:schemeClr val="accent2"/>
+            </a:effectRef>
+            <a:fontRef idx="minor">
+              <a:schemeClr val="dk1"/>
+            </a:fontRef>
+          </p:style>
+        </p:cxnSp>
+        <p:sp>
+          <p:nvSpPr>
+            <p:cNvPr id="143" name="Isosceles Triangle 102">
+              <a:extLst>
+                <a:ext uri="{FF2B5EF4-FFF2-40B4-BE49-F238E27FC236}">
+                  <a16:creationId xmlns:a16="http://schemas.microsoft.com/office/drawing/2014/main" id="{1AFB8D71-510B-4F11-8723-CEF99B2D348E}"/>
+                </a:ext>
+              </a:extLst>
+            </p:cNvPr>
+            <p:cNvSpPr/>
+            <p:nvPr/>
+          </p:nvSpPr>
+          <p:spPr>
+            <a:xfrm rot="5400000" flipV="1">
+              <a:off x="4177618" y="3852873"/>
+              <a:ext cx="270504" cy="175523"/>
+            </a:xfrm>
+            <a:prstGeom prst="triangle">
+              <a:avLst/>
+            </a:prstGeom>
+            <a:solidFill>
+              <a:schemeClr val="accent6">
+                <a:lumMod val="75000"/>
+              </a:schemeClr>
+            </a:solidFill>
+            <a:ln w="19050">
+              <a:solidFill>
+                <a:schemeClr val="accent6">
+                  <a:lumMod val="75000"/>
+                </a:schemeClr>
+              </a:solidFill>
+            </a:ln>
+            <a:effectLst/>
+          </p:spPr>
+          <p:style>
+            <a:lnRef idx="1">
+              <a:schemeClr val="accent2"/>
+            </a:lnRef>
+            <a:fillRef idx="2">
+              <a:schemeClr val="accent2"/>
+            </a:fillRef>
+            <a:effectRef idx="1">
+              <a:schemeClr val="accent2"/>
+            </a:effectRef>
+            <a:fontRef idx="minor">
+              <a:schemeClr val="dk1"/>
+            </a:fontRef>
+          </p:style>
+          <p:txBody>
+            <a:bodyPr rtlCol="0" anchor="ctr"/>
+            <a:lstStyle/>
+            <a:p>
+              <a:pPr algn="ctr"/>
+              <a:endParaRPr lang="en-SG" sz="1050">
+                <a:solidFill>
+                  <a:schemeClr val="bg1"/>
+                </a:solidFill>
+              </a:endParaRPr>
+            </a:p>
+          </p:txBody>
+        </p:sp>
+        <p:cxnSp>
+          <p:nvCxnSpPr>
+            <p:cNvPr id="144" name="Elbow Connector 122">
+              <a:extLst>
+                <a:ext uri="{FF2B5EF4-FFF2-40B4-BE49-F238E27FC236}">
+                  <a16:creationId xmlns:a16="http://schemas.microsoft.com/office/drawing/2014/main" id="{D042CA56-810D-46F9-A83C-EAABE92E721C}"/>
+                </a:ext>
+              </a:extLst>
+            </p:cNvPr>
+            <p:cNvCxnSpPr>
+              <a:stCxn id="145" idx="3"/>
+              <a:endCxn id="146" idx="1"/>
+            </p:cNvCxnSpPr>
+            <p:nvPr/>
+          </p:nvCxnSpPr>
+          <p:spPr>
+            <a:xfrm>
+              <a:off x="5733077" y="3939450"/>
+              <a:ext cx="228600" cy="1970"/>
+            </a:xfrm>
+            <a:prstGeom prst="bentConnector3">
+              <a:avLst>
+                <a:gd name="adj1" fmla="val 50000"/>
+              </a:avLst>
+            </a:prstGeom>
+            <a:ln w="19050">
+              <a:solidFill>
+                <a:schemeClr val="accent6">
+                  <a:lumMod val="75000"/>
+                </a:schemeClr>
+              </a:solidFill>
+              <a:prstDash val="sysDot"/>
+              <a:headEnd type="none" w="med" len="med"/>
+              <a:tailEnd type="arrow" w="med" len="med"/>
+            </a:ln>
+            <a:effectLst/>
+          </p:spPr>
+          <p:style>
+            <a:lnRef idx="1">
+              <a:schemeClr val="accent2"/>
+            </a:lnRef>
+            <a:fillRef idx="2">
+              <a:schemeClr val="accent2"/>
+            </a:fillRef>
+            <a:effectRef idx="1">
+              <a:schemeClr val="accent2"/>
+            </a:effectRef>
+            <a:fontRef idx="minor">
+              <a:schemeClr val="dk1"/>
+            </a:fontRef>
+          </p:style>
+        </p:cxnSp>
+        <p:sp>
+          <p:nvSpPr>
+            <p:cNvPr id="145" name="Rectangle 8">
+              <a:extLst>
+                <a:ext uri="{FF2B5EF4-FFF2-40B4-BE49-F238E27FC236}">
+                  <a16:creationId xmlns:a16="http://schemas.microsoft.com/office/drawing/2014/main" id="{DD14B432-0E3A-43D8-BE98-9502991CE26E}"/>
+                </a:ext>
+              </a:extLst>
+            </p:cNvPr>
+            <p:cNvSpPr/>
+            <p:nvPr/>
+          </p:nvSpPr>
+          <p:spPr>
+            <a:xfrm>
+              <a:off x="4563242" y="3766070"/>
+              <a:ext cx="1169835" cy="346760"/>
+            </a:xfrm>
+            <a:prstGeom prst="rect">
+              <a:avLst/>
+            </a:prstGeom>
+            <a:ln w="19050"/>
+            <a:effectLst/>
+          </p:spPr>
+          <p:style>
+            <a:lnRef idx="1">
+              <a:schemeClr val="accent6"/>
+            </a:lnRef>
+            <a:fillRef idx="2">
+              <a:schemeClr val="accent6"/>
+            </a:fillRef>
+            <a:effectRef idx="1">
+              <a:schemeClr val="accent6"/>
+            </a:effectRef>
+            <a:fontRef idx="minor">
+              <a:schemeClr val="dk1"/>
+            </a:fontRef>
+          </p:style>
+          <p:txBody>
+            <a:bodyPr rtlCol="0" anchor="ctr"/>
+            <a:lstStyle/>
+            <a:p>
+              <a:pPr algn="ctr"/>
+              <a:r>
+                <a:rPr lang="en-US" sz="900" b="1" dirty="0" err="1">
+                  <a:solidFill>
+                    <a:schemeClr val="accent6">
+                      <a:lumMod val="75000"/>
+                    </a:schemeClr>
+                  </a:solidFill>
+                </a:rPr>
+                <a:t>JsonTaskList</a:t>
+              </a:r>
+              <a:br>
+                <a:rPr lang="en-US" sz="900" b="1" dirty="0">
+                  <a:solidFill>
+                    <a:schemeClr val="accent6">
+                      <a:lumMod val="75000"/>
+                    </a:schemeClr>
+                  </a:solidFill>
+                </a:rPr>
+              </a:br>
+              <a:r>
+                <a:rPr lang="en-US" sz="900" b="1" dirty="0">
+                  <a:solidFill>
+                    <a:schemeClr val="accent6">
+                      <a:lumMod val="75000"/>
+                    </a:schemeClr>
+                  </a:solidFill>
+                </a:rPr>
+                <a:t>Storage</a:t>
+              </a:r>
+              <a:endParaRPr lang="en-SG" sz="900" b="1" dirty="0">
+                <a:solidFill>
+                  <a:schemeClr val="accent6">
+                    <a:lumMod val="75000"/>
+                  </a:schemeClr>
+                </a:solidFill>
+              </a:endParaRPr>
+            </a:p>
+          </p:txBody>
+        </p:sp>
+        <p:sp>
+          <p:nvSpPr>
+            <p:cNvPr id="146" name="Rectangle 8">
+              <a:extLst>
+                <a:ext uri="{FF2B5EF4-FFF2-40B4-BE49-F238E27FC236}">
+                  <a16:creationId xmlns:a16="http://schemas.microsoft.com/office/drawing/2014/main" id="{ADFDD7A6-3A48-4BE5-8FB9-07DFB32DEDF0}"/>
+                </a:ext>
+              </a:extLst>
+            </p:cNvPr>
+            <p:cNvSpPr/>
+            <p:nvPr/>
+          </p:nvSpPr>
+          <p:spPr>
+            <a:xfrm>
+              <a:off x="5961677" y="3768040"/>
+              <a:ext cx="1200707" cy="346760"/>
+            </a:xfrm>
+            <a:prstGeom prst="rect">
+              <a:avLst/>
+            </a:prstGeom>
+            <a:ln w="19050"/>
+            <a:effectLst/>
+          </p:spPr>
+          <p:style>
+            <a:lnRef idx="1">
+              <a:schemeClr val="accent6"/>
+            </a:lnRef>
+            <a:fillRef idx="2">
+              <a:schemeClr val="accent6"/>
+            </a:fillRef>
+            <a:effectRef idx="1">
+              <a:schemeClr val="accent6"/>
+            </a:effectRef>
+            <a:fontRef idx="minor">
+              <a:schemeClr val="dk1"/>
+            </a:fontRef>
+          </p:style>
+          <p:txBody>
+            <a:bodyPr rtlCol="0" anchor="ctr"/>
+            <a:lstStyle/>
+            <a:p>
+              <a:pPr algn="ctr"/>
+              <a:r>
+                <a:rPr lang="en-US" sz="1050" b="1" dirty="0" err="1">
+                  <a:solidFill>
+                    <a:schemeClr val="accent6">
+                      <a:lumMod val="75000"/>
+                    </a:schemeClr>
+                  </a:solidFill>
+                </a:rPr>
+                <a:t>JsonSerializable</a:t>
+              </a:r>
+              <a:br>
+                <a:rPr lang="en-US" sz="1050" b="1" dirty="0">
+                  <a:solidFill>
+                    <a:schemeClr val="accent6">
+                      <a:lumMod val="75000"/>
+                    </a:schemeClr>
+                  </a:solidFill>
+                </a:rPr>
+              </a:br>
+              <a:r>
+                <a:rPr lang="en-US" sz="1050" b="1" dirty="0" err="1">
+                  <a:solidFill>
+                    <a:schemeClr val="accent6">
+                      <a:lumMod val="75000"/>
+                    </a:schemeClr>
+                  </a:solidFill>
+                </a:rPr>
+                <a:t>TaskList</a:t>
+              </a:r>
+              <a:endParaRPr lang="en-SG" sz="1050" b="1" dirty="0">
+                <a:solidFill>
+                  <a:schemeClr val="accent6">
+                    <a:lumMod val="75000"/>
+                  </a:schemeClr>
+                </a:solidFill>
+              </a:endParaRPr>
+            </a:p>
+          </p:txBody>
+        </p:sp>
+        <p:sp>
+          <p:nvSpPr>
+            <p:cNvPr id="147" name="Rectangle 8">
+              <a:extLst>
+                <a:ext uri="{FF2B5EF4-FFF2-40B4-BE49-F238E27FC236}">
+                  <a16:creationId xmlns:a16="http://schemas.microsoft.com/office/drawing/2014/main" id="{20B7EA01-3FF4-44C4-92AB-AF223D98E043}"/>
+                </a:ext>
+              </a:extLst>
+            </p:cNvPr>
+            <p:cNvSpPr/>
+            <p:nvPr/>
+          </p:nvSpPr>
+          <p:spPr>
+            <a:xfrm>
+              <a:off x="7412729" y="3767254"/>
+              <a:ext cx="1404604" cy="346760"/>
+            </a:xfrm>
+            <a:prstGeom prst="rect">
+              <a:avLst/>
+            </a:prstGeom>
+            <a:ln w="19050"/>
+            <a:effectLst/>
+          </p:spPr>
+          <p:style>
+            <a:lnRef idx="1">
+              <a:schemeClr val="accent6"/>
+            </a:lnRef>
+            <a:fillRef idx="2">
+              <a:schemeClr val="accent6"/>
+            </a:fillRef>
+            <a:effectRef idx="1">
+              <a:schemeClr val="accent6"/>
+            </a:effectRef>
+            <a:fontRef idx="minor">
+              <a:schemeClr val="dk1"/>
+            </a:fontRef>
+          </p:style>
+          <p:txBody>
+            <a:bodyPr rtlCol="0" anchor="ctr"/>
+            <a:lstStyle/>
+            <a:p>
+              <a:pPr algn="ctr"/>
+              <a:r>
+                <a:rPr lang="en-US" sz="1030" b="1" dirty="0" err="1">
+                  <a:solidFill>
+                    <a:schemeClr val="accent6">
+                      <a:lumMod val="75000"/>
+                    </a:schemeClr>
+                  </a:solidFill>
+                </a:rPr>
+                <a:t>JsonAdaptedTask</a:t>
+              </a:r>
+              <a:endParaRPr lang="en-SG" sz="1030" b="1" dirty="0">
+                <a:solidFill>
+                  <a:schemeClr val="accent6">
+                    <a:lumMod val="75000"/>
+                  </a:schemeClr>
+                </a:solidFill>
+              </a:endParaRPr>
+            </a:p>
+          </p:txBody>
+        </p:sp>
+        <p:cxnSp>
+          <p:nvCxnSpPr>
+            <p:cNvPr id="148" name="Elbow Connector 122">
+              <a:extLst>
+                <a:ext uri="{FF2B5EF4-FFF2-40B4-BE49-F238E27FC236}">
+                  <a16:creationId xmlns:a16="http://schemas.microsoft.com/office/drawing/2014/main" id="{FB244648-30C3-4334-B961-B02AA462C7DE}"/>
+                </a:ext>
+              </a:extLst>
+            </p:cNvPr>
+            <p:cNvCxnSpPr>
+              <a:cxnSpLocks/>
+              <a:stCxn id="146" idx="3"/>
+              <a:endCxn id="147" idx="1"/>
+            </p:cNvCxnSpPr>
+            <p:nvPr/>
+          </p:nvCxnSpPr>
+          <p:spPr>
+            <a:xfrm flipV="1">
+              <a:off x="7162384" y="3940634"/>
+              <a:ext cx="250345" cy="786"/>
+            </a:xfrm>
+            <a:prstGeom prst="bentConnector3">
+              <a:avLst>
+                <a:gd name="adj1" fmla="val 50000"/>
+              </a:avLst>
+            </a:prstGeom>
+            <a:ln w="19050">
+              <a:prstDash val="sysDot"/>
+              <a:headEnd type="none" w="med" len="med"/>
+              <a:tailEnd type="arrow" w="med" len="med"/>
+            </a:ln>
+            <a:effectLst/>
+          </p:spPr>
+          <p:style>
+            <a:lnRef idx="1">
+              <a:schemeClr val="accent6"/>
+            </a:lnRef>
+            <a:fillRef idx="2">
+              <a:schemeClr val="accent6"/>
+            </a:fillRef>
+            <a:effectRef idx="1">
+              <a:schemeClr val="accent6"/>
+            </a:effectRef>
+            <a:fontRef idx="minor">
+              <a:schemeClr val="dk1"/>
+            </a:fontRef>
+          </p:style>
+        </p:cxnSp>
+      </p:grpSp>
       <p:cxnSp>
         <p:nvCxnSpPr>
-          <p:cNvPr id="77" name="Elbow Connector 122"/>
+          <p:cNvPr id="159" name="Straight Connector 158">
+            <a:extLst>
+              <a:ext uri="{FF2B5EF4-FFF2-40B4-BE49-F238E27FC236}">
+                <a16:creationId xmlns:a16="http://schemas.microsoft.com/office/drawing/2014/main" id="{DA4FF512-16D9-4E6F-A664-4BB05654EEFA}"/>
+              </a:ext>
+            </a:extLst>
+          </p:cNvPr>
+          <p:cNvCxnSpPr/>
+          <p:nvPr/>
+        </p:nvCxnSpPr>
+        <p:spPr>
+          <a:xfrm flipV="1">
+            <a:off x="7412224" y="2833344"/>
+            <a:ext cx="0" cy="319690"/>
+          </a:xfrm>
+          <a:prstGeom prst="line">
+            <a:avLst/>
+          </a:prstGeom>
+          <a:ln w="19050">
+            <a:solidFill>
+              <a:schemeClr val="accent6"/>
+            </a:solidFill>
+            <a:prstDash val="sysDot"/>
+            <a:headEnd type="none" w="med" len="med"/>
+            <a:tailEnd type="arrow" w="med" len="med"/>
+          </a:ln>
+        </p:spPr>
+        <p:style>
+          <a:lnRef idx="1">
+            <a:schemeClr val="accent1"/>
+          </a:lnRef>
+          <a:fillRef idx="0">
+            <a:schemeClr val="accent1"/>
+          </a:fillRef>
+          <a:effectRef idx="0">
+            <a:schemeClr val="accent1"/>
+          </a:effectRef>
+          <a:fontRef idx="minor">
+            <a:schemeClr val="tx1"/>
+          </a:fontRef>
+        </p:style>
+      </p:cxnSp>
+      <p:cxnSp>
+        <p:nvCxnSpPr>
+          <p:cNvPr id="169" name="Connector: Elbow 168">
+            <a:extLst>
+              <a:ext uri="{FF2B5EF4-FFF2-40B4-BE49-F238E27FC236}">
+                <a16:creationId xmlns:a16="http://schemas.microsoft.com/office/drawing/2014/main" id="{3BDEA8BD-8CA8-4B32-B721-C7B27995243E}"/>
+              </a:ext>
+            </a:extLst>
+          </p:cNvPr>
           <p:cNvCxnSpPr>
-            <a:stCxn id="66" idx="3"/>
-            <a:endCxn id="74" idx="1"/>
+            <a:stCxn id="136" idx="3"/>
           </p:cNvCxnSpPr>
           <p:nvPr/>
         </p:nvCxnSpPr>
         <p:spPr>
           <a:xfrm flipV="1">
-            <a:off x="7220507" y="3333004"/>
-            <a:ext cx="395231" cy="786"/>
+            <a:off x="8114526" y="2824416"/>
+            <a:ext cx="419874" cy="2564369"/>
           </a:xfrm>
-          <a:prstGeom prst="bentConnector3">
-            <a:avLst>
-              <a:gd name="adj1" fmla="val 50000"/>
-            </a:avLst>
+          <a:prstGeom prst="bentConnector2">
+            <a:avLst/>
           </a:prstGeom>
           <a:ln w="19050">
+            <a:solidFill>
+              <a:schemeClr val="accent6"/>
+            </a:solidFill>
             <a:prstDash val="sysDot"/>
             <a:headEnd type="none" w="med" len="med"/>
             <a:tailEnd type="arrow" w="med" len="med"/>
           </a:ln>
-          <a:effectLst/>
         </p:spPr>
         <p:style>
           <a:lnRef idx="1">
-            <a:schemeClr val="accent6"/>
+            <a:schemeClr val="accent1"/>
           </a:lnRef>
-          <a:fillRef idx="2">
-            <a:schemeClr val="accent6"/>
+          <a:fillRef idx="0">
+            <a:schemeClr val="accent1"/>
           </a:fillRef>
-          <a:effectRef idx="1">
-            <a:schemeClr val="accent6"/>
+          <a:effectRef idx="0">
+            <a:schemeClr val="accent1"/>
           </a:effectRef>
           <a:fontRef idx="minor">
-            <a:schemeClr val="dk1"/>
+            <a:schemeClr val="tx1"/>
+          </a:fontRef>
+        </p:style>
+      </p:cxnSp>
+      <p:cxnSp>
+        <p:nvCxnSpPr>
+          <p:cNvPr id="171" name="Straight Connector 170">
+            <a:extLst>
+              <a:ext uri="{FF2B5EF4-FFF2-40B4-BE49-F238E27FC236}">
+                <a16:creationId xmlns:a16="http://schemas.microsoft.com/office/drawing/2014/main" id="{2075EA7E-9DDA-4FE4-B42C-23B73A49F8EF}"/>
+              </a:ext>
+            </a:extLst>
+          </p:cNvPr>
+          <p:cNvCxnSpPr>
+            <a:cxnSpLocks/>
+            <a:stCxn id="147" idx="3"/>
+          </p:cNvCxnSpPr>
+          <p:nvPr/>
+        </p:nvCxnSpPr>
+        <p:spPr>
+          <a:xfrm>
+            <a:off x="8114526" y="3336337"/>
+            <a:ext cx="419874" cy="0"/>
+          </a:xfrm>
+          <a:prstGeom prst="line">
+            <a:avLst/>
+          </a:prstGeom>
+          <a:ln w="19050">
+            <a:solidFill>
+              <a:schemeClr val="accent6"/>
+            </a:solidFill>
+            <a:prstDash val="sysDot"/>
+          </a:ln>
+        </p:spPr>
+        <p:style>
+          <a:lnRef idx="1">
+            <a:schemeClr val="accent1"/>
+          </a:lnRef>
+          <a:fillRef idx="0">
+            <a:schemeClr val="accent1"/>
+          </a:fillRef>
+          <a:effectRef idx="0">
+            <a:schemeClr val="accent1"/>
+          </a:effectRef>
+          <a:fontRef idx="minor">
+            <a:schemeClr val="tx1"/>
+          </a:fontRef>
+        </p:style>
+      </p:cxnSp>
+      <p:cxnSp>
+        <p:nvCxnSpPr>
+          <p:cNvPr id="174" name="Straight Connector 173">
+            <a:extLst>
+              <a:ext uri="{FF2B5EF4-FFF2-40B4-BE49-F238E27FC236}">
+                <a16:creationId xmlns:a16="http://schemas.microsoft.com/office/drawing/2014/main" id="{DB3B845D-63A1-482F-B82E-BB2472F95AAB}"/>
+              </a:ext>
+            </a:extLst>
+          </p:cNvPr>
+          <p:cNvCxnSpPr>
+            <a:cxnSpLocks/>
+          </p:cNvCxnSpPr>
+          <p:nvPr/>
+        </p:nvCxnSpPr>
+        <p:spPr>
+          <a:xfrm>
+            <a:off x="8114526" y="3841436"/>
+            <a:ext cx="419874" cy="0"/>
+          </a:xfrm>
+          <a:prstGeom prst="line">
+            <a:avLst/>
+          </a:prstGeom>
+          <a:ln w="19050">
+            <a:solidFill>
+              <a:schemeClr val="accent6"/>
+            </a:solidFill>
+            <a:prstDash val="sysDot"/>
+          </a:ln>
+        </p:spPr>
+        <p:style>
+          <a:lnRef idx="1">
+            <a:schemeClr val="accent1"/>
+          </a:lnRef>
+          <a:fillRef idx="0">
+            <a:schemeClr val="accent1"/>
+          </a:fillRef>
+          <a:effectRef idx="0">
+            <a:schemeClr val="accent1"/>
+          </a:effectRef>
+          <a:fontRef idx="minor">
+            <a:schemeClr val="tx1"/>
+          </a:fontRef>
+        </p:style>
+      </p:cxnSp>
+      <p:cxnSp>
+        <p:nvCxnSpPr>
+          <p:cNvPr id="175" name="Straight Connector 174">
+            <a:extLst>
+              <a:ext uri="{FF2B5EF4-FFF2-40B4-BE49-F238E27FC236}">
+                <a16:creationId xmlns:a16="http://schemas.microsoft.com/office/drawing/2014/main" id="{2476E41F-12FA-42D4-8EB7-D23AD1583878}"/>
+              </a:ext>
+            </a:extLst>
+          </p:cNvPr>
+          <p:cNvCxnSpPr>
+            <a:cxnSpLocks/>
+          </p:cNvCxnSpPr>
+          <p:nvPr/>
+        </p:nvCxnSpPr>
+        <p:spPr>
+          <a:xfrm>
+            <a:off x="8114526" y="4363517"/>
+            <a:ext cx="419874" cy="0"/>
+          </a:xfrm>
+          <a:prstGeom prst="line">
+            <a:avLst/>
+          </a:prstGeom>
+          <a:ln w="19050">
+            <a:solidFill>
+              <a:schemeClr val="accent6"/>
+            </a:solidFill>
+            <a:prstDash val="sysDot"/>
+          </a:ln>
+        </p:spPr>
+        <p:style>
+          <a:lnRef idx="1">
+            <a:schemeClr val="accent1"/>
+          </a:lnRef>
+          <a:fillRef idx="0">
+            <a:schemeClr val="accent1"/>
+          </a:fillRef>
+          <a:effectRef idx="0">
+            <a:schemeClr val="accent1"/>
+          </a:effectRef>
+          <a:fontRef idx="minor">
+            <a:schemeClr val="tx1"/>
+          </a:fontRef>
+        </p:style>
+      </p:cxnSp>
+      <p:cxnSp>
+        <p:nvCxnSpPr>
+          <p:cNvPr id="176" name="Straight Connector 175">
+            <a:extLst>
+              <a:ext uri="{FF2B5EF4-FFF2-40B4-BE49-F238E27FC236}">
+                <a16:creationId xmlns:a16="http://schemas.microsoft.com/office/drawing/2014/main" id="{621E7D38-66A4-4E77-B5A7-0DCD38234322}"/>
+              </a:ext>
+            </a:extLst>
+          </p:cNvPr>
+          <p:cNvCxnSpPr>
+            <a:cxnSpLocks/>
+          </p:cNvCxnSpPr>
+          <p:nvPr/>
+        </p:nvCxnSpPr>
+        <p:spPr>
+          <a:xfrm>
+            <a:off x="8128109" y="4873930"/>
+            <a:ext cx="419874" cy="0"/>
+          </a:xfrm>
+          <a:prstGeom prst="line">
+            <a:avLst/>
+          </a:prstGeom>
+          <a:ln w="19050">
+            <a:solidFill>
+              <a:schemeClr val="accent6"/>
+            </a:solidFill>
+            <a:prstDash val="sysDot"/>
+          </a:ln>
+        </p:spPr>
+        <p:style>
+          <a:lnRef idx="1">
+            <a:schemeClr val="accent1"/>
+          </a:lnRef>
+          <a:fillRef idx="0">
+            <a:schemeClr val="accent1"/>
+          </a:fillRef>
+          <a:effectRef idx="0">
+            <a:schemeClr val="accent1"/>
+          </a:effectRef>
+          <a:fontRef idx="minor">
+            <a:schemeClr val="tx1"/>
           </a:fontRef>
         </p:style>
       </p:cxnSp>

</xml_diff>